<commit_message>
added extra slides to presentation
</commit_message>
<xml_diff>
--- a/presentation/Graf widoczności.pptx
+++ b/presentation/Graf widoczności.pptx
@@ -16,6 +16,7 @@
     <p:sldId id="261" r:id="rId11"/>
     <p:sldId id="262" r:id="rId12"/>
     <p:sldId id="263" r:id="rId13"/>
+    <p:sldId id="264" r:id="rId14"/>
   </p:sldIdLst>
   <p:sldSz cy="5143500" cx="9144000"/>
   <p:notesSz cx="6858000" cy="9144000"/>
@@ -1094,7 +1095,7 @@
   <p:cSld>
     <p:spTree>
       <p:nvGrpSpPr>
-        <p:cNvPr id="75" name="Shape 75"/>
+        <p:cNvPr id="76" name="Shape 76"/>
         <p:cNvGrpSpPr/>
         <p:nvPr/>
       </p:nvGrpSpPr>
@@ -1108,7 +1109,7 @@
       </p:grpSpPr>
       <p:sp>
         <p:nvSpPr>
-          <p:cNvPr id="76" name="Google Shape;76;g6c1654b175_0_63:notes"/>
+          <p:cNvPr id="77" name="Google Shape;77;g6c1654b175_0_69:notes"/>
           <p:cNvSpPr/>
           <p:nvPr>
             <p:ph idx="2" type="sldImg"/>
@@ -1143,7 +1144,7 @@
       </p:sp>
       <p:sp>
         <p:nvSpPr>
-          <p:cNvPr id="77" name="Google Shape;77;g6c1654b175_0_63:notes"/>
+          <p:cNvPr id="78" name="Google Shape;78;g6c1654b175_0_69:notes"/>
           <p:cNvSpPr txBox="1"/>
           <p:nvPr>
             <p:ph idx="1" type="body"/>
@@ -1193,7 +1194,7 @@
   <p:cSld>
     <p:spTree>
       <p:nvGrpSpPr>
-        <p:cNvPr id="81" name="Shape 81"/>
+        <p:cNvPr id="84" name="Shape 84"/>
         <p:cNvGrpSpPr/>
         <p:nvPr/>
       </p:nvGrpSpPr>
@@ -1207,7 +1208,7 @@
       </p:grpSpPr>
       <p:sp>
         <p:nvSpPr>
-          <p:cNvPr id="82" name="Google Shape;82;g6c1654b175_0_69:notes"/>
+          <p:cNvPr id="85" name="Google Shape;85;g6c1654b175_0_63:notes"/>
           <p:cNvSpPr/>
           <p:nvPr>
             <p:ph idx="2" type="sldImg"/>
@@ -1242,7 +1243,7 @@
       </p:sp>
       <p:sp>
         <p:nvSpPr>
-          <p:cNvPr id="83" name="Google Shape;83;g6c1654b175_0_69:notes"/>
+          <p:cNvPr id="86" name="Google Shape;86;g6c1654b175_0_63:notes"/>
           <p:cNvSpPr txBox="1"/>
           <p:nvPr>
             <p:ph idx="1" type="body"/>
@@ -1292,7 +1293,7 @@
   <p:cSld>
     <p:spTree>
       <p:nvGrpSpPr>
-        <p:cNvPr id="87" name="Shape 87"/>
+        <p:cNvPr id="89" name="Shape 89"/>
         <p:cNvGrpSpPr/>
         <p:nvPr/>
       </p:nvGrpSpPr>
@@ -1306,7 +1307,7 @@
       </p:grpSpPr>
       <p:sp>
         <p:nvSpPr>
-          <p:cNvPr id="88" name="Google Shape;88;g6c1654b175_0_82:notes"/>
+          <p:cNvPr id="90" name="Google Shape;90;g6cb5e7f303_1_10:notes"/>
           <p:cNvSpPr/>
           <p:nvPr>
             <p:ph idx="2" type="sldImg"/>
@@ -1341,7 +1342,7 @@
       </p:sp>
       <p:sp>
         <p:nvSpPr>
-          <p:cNvPr id="89" name="Google Shape;89;g6c1654b175_0_82:notes"/>
+          <p:cNvPr id="91" name="Google Shape;91;g6cb5e7f303_1_10:notes"/>
           <p:cNvSpPr txBox="1"/>
           <p:nvPr>
             <p:ph idx="1" type="body"/>
@@ -1391,7 +1392,7 @@
   <p:cSld>
     <p:spTree>
       <p:nvGrpSpPr>
-        <p:cNvPr id="93" name="Shape 93"/>
+        <p:cNvPr id="94" name="Shape 94"/>
         <p:cNvGrpSpPr/>
         <p:nvPr/>
       </p:nvGrpSpPr>
@@ -1405,7 +1406,7 @@
       </p:grpSpPr>
       <p:sp>
         <p:nvSpPr>
-          <p:cNvPr id="94" name="Google Shape;94;g6c1654b175_0_87:notes"/>
+          <p:cNvPr id="95" name="Google Shape;95;g6c1654b175_0_82:notes"/>
           <p:cNvSpPr/>
           <p:nvPr>
             <p:ph idx="2" type="sldImg"/>
@@ -1440,7 +1441,106 @@
       </p:sp>
       <p:sp>
         <p:nvSpPr>
-          <p:cNvPr id="95" name="Google Shape;95;g6c1654b175_0_87:notes"/>
+          <p:cNvPr id="96" name="Google Shape;96;g6c1654b175_0_82:notes"/>
+          <p:cNvSpPr txBox="1"/>
+          <p:nvPr>
+            <p:ph idx="1" type="body"/>
+          </p:nvPr>
+        </p:nvSpPr>
+        <p:spPr>
+          <a:xfrm>
+            <a:off x="685800" y="4343400"/>
+            <a:ext cx="5486400" cy="4114800"/>
+          </a:xfrm>
+          <a:prstGeom prst="rect">
+            <a:avLst/>
+          </a:prstGeom>
+        </p:spPr>
+        <p:txBody>
+          <a:bodyPr anchorCtr="0" anchor="t" bIns="91425" lIns="91425" spcFirstLastPara="1" rIns="91425" wrap="square" tIns="91425">
+            <a:noAutofit/>
+          </a:bodyPr>
+          <a:lstStyle/>
+          <a:p>
+            <a:pPr indent="0" lvl="0" marL="0" rtl="0" algn="l">
+              <a:spcBef>
+                <a:spcPts val="0"/>
+              </a:spcBef>
+              <a:spcAft>
+                <a:spcPts val="0"/>
+              </a:spcAft>
+              <a:buNone/>
+            </a:pPr>
+            <a:r>
+              <a:t/>
+            </a:r>
+            <a:endParaRPr/>
+          </a:p>
+        </p:txBody>
+      </p:sp>
+    </p:spTree>
+  </p:cSld>
+  <p:clrMapOvr>
+    <a:masterClrMapping/>
+  </p:clrMapOvr>
+</p:notes>
+</file>
+
+<file path=ppt/notesSlides/notesSlide9.xml><?xml version="1.0" encoding="utf-8"?>
+<p:notes xmlns:a="http://schemas.openxmlformats.org/drawingml/2006/main" xmlns:r="http://schemas.openxmlformats.org/officeDocument/2006/relationships" xmlns:mc="http://schemas.openxmlformats.org/markup-compatibility/2006" xmlns:mv="urn:schemas-microsoft-com:mac:vml" xmlns:p="http://schemas.openxmlformats.org/presentationml/2006/main" xmlns:c="http://schemas.openxmlformats.org/drawingml/2006/chart" xmlns:dgm="http://schemas.openxmlformats.org/drawingml/2006/diagram" xmlns:o="urn:schemas-microsoft-com:office:office" xmlns:v="urn:schemas-microsoft-com:vml" xmlns:pvml="urn:schemas-microsoft-com:office:powerpoint" xmlns:com="http://schemas.openxmlformats.org/drawingml/2006/compatibility" xmlns:p14="http://schemas.microsoft.com/office/powerpoint/2010/main" xmlns:p15="http://schemas.microsoft.com/office/powerpoint/2012/main" showMasterPhAnim="0" showMasterSp="0">
+  <p:cSld>
+    <p:spTree>
+      <p:nvGrpSpPr>
+        <p:cNvPr id="100" name="Shape 100"/>
+        <p:cNvGrpSpPr/>
+        <p:nvPr/>
+      </p:nvGrpSpPr>
+      <p:grpSpPr>
+        <a:xfrm>
+          <a:off x="0" y="0"/>
+          <a:ext cx="0" cy="0"/>
+          <a:chOff x="0" y="0"/>
+          <a:chExt cx="0" cy="0"/>
+        </a:xfrm>
+      </p:grpSpPr>
+      <p:sp>
+        <p:nvSpPr>
+          <p:cNvPr id="101" name="Google Shape;101;g6c1654b175_0_87:notes"/>
+          <p:cNvSpPr/>
+          <p:nvPr>
+            <p:ph idx="2" type="sldImg"/>
+          </p:nvPr>
+        </p:nvSpPr>
+        <p:spPr>
+          <a:xfrm>
+            <a:off x="381300" y="685800"/>
+            <a:ext cx="6096000" cy="3429000"/>
+          </a:xfrm>
+          <a:custGeom>
+            <a:rect b="b" l="l" r="r" t="t"/>
+            <a:pathLst>
+              <a:path extrusionOk="0" h="120000" w="120000">
+                <a:moveTo>
+                  <a:pt x="0" y="0"/>
+                </a:moveTo>
+                <a:lnTo>
+                  <a:pt x="120000" y="0"/>
+                </a:lnTo>
+                <a:lnTo>
+                  <a:pt x="120000" y="120000"/>
+                </a:lnTo>
+                <a:lnTo>
+                  <a:pt x="0" y="120000"/>
+                </a:lnTo>
+                <a:close/>
+              </a:path>
+            </a:pathLst>
+          </a:custGeom>
+        </p:spPr>
+      </p:sp>
+      <p:sp>
+        <p:nvSpPr>
+          <p:cNvPr id="102" name="Google Shape;102;g6c1654b175_0_87:notes"/>
           <p:cNvSpPr txBox="1"/>
           <p:nvPr>
             <p:ph idx="1" type="body"/>
@@ -4209,14 +4309,14 @@
         </p:nvSpPr>
         <p:spPr>
           <a:xfrm>
-            <a:off x="4572000" y="25"/>
+            <a:off x="4572000" y="-125"/>
             <a:ext cx="4572000" cy="5143500"/>
           </a:xfrm>
           <a:prstGeom prst="rect">
             <a:avLst/>
           </a:prstGeom>
           <a:solidFill>
-            <a:schemeClr val="dk2"/>
+            <a:schemeClr val="lt2"/>
           </a:solidFill>
           <a:ln>
             <a:noFill/>
@@ -4531,7 +4631,7 @@
         </p:nvSpPr>
         <p:spPr>
           <a:xfrm>
-            <a:off x="4939500" y="724200"/>
+            <a:off x="4939500" y="724075"/>
             <a:ext cx="3837000" cy="3695100"/>
           </a:xfrm>
           <a:prstGeom prst="rect">
@@ -4550,16 +4650,9 @@
               <a:spcAft>
                 <a:spcPts val="0"/>
               </a:spcAft>
-              <a:buClr>
-                <a:schemeClr val="dk1"/>
-              </a:buClr>
               <a:buSzPts val="1800"/>
               <a:buChar char="●"/>
-              <a:defRPr>
-                <a:solidFill>
-                  <a:schemeClr val="dk1"/>
-                </a:solidFill>
-              </a:defRPr>
+              <a:defRPr/>
             </a:lvl1pPr>
             <a:lvl2pPr indent="-317500" lvl="1" marL="914400">
               <a:spcBef>
@@ -4568,16 +4661,9 @@
               <a:spcAft>
                 <a:spcPts val="0"/>
               </a:spcAft>
-              <a:buClr>
-                <a:schemeClr val="dk1"/>
-              </a:buClr>
               <a:buSzPts val="1400"/>
               <a:buChar char="○"/>
-              <a:defRPr>
-                <a:solidFill>
-                  <a:schemeClr val="dk1"/>
-                </a:solidFill>
-              </a:defRPr>
+              <a:defRPr/>
             </a:lvl2pPr>
             <a:lvl3pPr indent="-317500" lvl="2" marL="1371600">
               <a:spcBef>
@@ -4586,16 +4672,9 @@
               <a:spcAft>
                 <a:spcPts val="0"/>
               </a:spcAft>
-              <a:buClr>
-                <a:schemeClr val="dk1"/>
-              </a:buClr>
               <a:buSzPts val="1400"/>
               <a:buChar char="■"/>
-              <a:defRPr>
-                <a:solidFill>
-                  <a:schemeClr val="dk1"/>
-                </a:solidFill>
-              </a:defRPr>
+              <a:defRPr/>
             </a:lvl3pPr>
             <a:lvl4pPr indent="-317500" lvl="3" marL="1828800">
               <a:spcBef>
@@ -4604,16 +4683,9 @@
               <a:spcAft>
                 <a:spcPts val="0"/>
               </a:spcAft>
-              <a:buClr>
-                <a:schemeClr val="dk1"/>
-              </a:buClr>
               <a:buSzPts val="1400"/>
               <a:buChar char="●"/>
-              <a:defRPr>
-                <a:solidFill>
-                  <a:schemeClr val="dk1"/>
-                </a:solidFill>
-              </a:defRPr>
+              <a:defRPr/>
             </a:lvl4pPr>
             <a:lvl5pPr indent="-317500" lvl="4" marL="2286000">
               <a:spcBef>
@@ -4622,16 +4694,9 @@
               <a:spcAft>
                 <a:spcPts val="0"/>
               </a:spcAft>
-              <a:buClr>
-                <a:schemeClr val="dk1"/>
-              </a:buClr>
               <a:buSzPts val="1400"/>
               <a:buChar char="○"/>
-              <a:defRPr>
-                <a:solidFill>
-                  <a:schemeClr val="dk1"/>
-                </a:solidFill>
-              </a:defRPr>
+              <a:defRPr/>
             </a:lvl5pPr>
             <a:lvl6pPr indent="-317500" lvl="5" marL="2743200">
               <a:spcBef>
@@ -4640,16 +4705,9 @@
               <a:spcAft>
                 <a:spcPts val="0"/>
               </a:spcAft>
-              <a:buClr>
-                <a:schemeClr val="dk1"/>
-              </a:buClr>
               <a:buSzPts val="1400"/>
               <a:buChar char="■"/>
-              <a:defRPr>
-                <a:solidFill>
-                  <a:schemeClr val="dk1"/>
-                </a:solidFill>
-              </a:defRPr>
+              <a:defRPr/>
             </a:lvl6pPr>
             <a:lvl7pPr indent="-317500" lvl="6" marL="3200400">
               <a:spcBef>
@@ -4658,16 +4716,9 @@
               <a:spcAft>
                 <a:spcPts val="0"/>
               </a:spcAft>
-              <a:buClr>
-                <a:schemeClr val="dk1"/>
-              </a:buClr>
               <a:buSzPts val="1400"/>
               <a:buChar char="●"/>
-              <a:defRPr>
-                <a:solidFill>
-                  <a:schemeClr val="dk1"/>
-                </a:solidFill>
-              </a:defRPr>
+              <a:defRPr/>
             </a:lvl7pPr>
             <a:lvl8pPr indent="-317500" lvl="7" marL="3657600">
               <a:spcBef>
@@ -4676,16 +4727,9 @@
               <a:spcAft>
                 <a:spcPts val="0"/>
               </a:spcAft>
-              <a:buClr>
-                <a:schemeClr val="dk1"/>
-              </a:buClr>
               <a:buSzPts val="1400"/>
               <a:buChar char="○"/>
-              <a:defRPr>
-                <a:solidFill>
-                  <a:schemeClr val="dk1"/>
-                </a:solidFill>
-              </a:defRPr>
+              <a:defRPr/>
             </a:lvl8pPr>
             <a:lvl9pPr indent="-317500" lvl="8" marL="4114800">
               <a:spcBef>
@@ -4694,16 +4738,9 @@
               <a:spcAft>
                 <a:spcPts val="1600"/>
               </a:spcAft>
-              <a:buClr>
-                <a:schemeClr val="dk1"/>
-              </a:buClr>
               <a:buSzPts val="1400"/>
               <a:buChar char="■"/>
-              <a:defRPr>
-                <a:solidFill>
-                  <a:schemeClr val="dk1"/>
-                </a:solidFill>
-              </a:defRPr>
+              <a:defRPr/>
             </a:lvl9pPr>
           </a:lstStyle>
           <a:p/>
@@ -4938,7 +4975,7 @@
 
 <file path=ppt/slideMasters/slideMaster1.xml><?xml version="1.0" encoding="utf-8"?>
 <p:sldMaster xmlns:a="http://schemas.openxmlformats.org/drawingml/2006/main" xmlns:r="http://schemas.openxmlformats.org/officeDocument/2006/relationships" xmlns:mc="http://schemas.openxmlformats.org/markup-compatibility/2006" xmlns:mv="urn:schemas-microsoft-com:mac:vml" xmlns:p="http://schemas.openxmlformats.org/presentationml/2006/main" xmlns:c="http://schemas.openxmlformats.org/drawingml/2006/chart" xmlns:dgm="http://schemas.openxmlformats.org/drawingml/2006/diagram" xmlns:o="urn:schemas-microsoft-com:office:office" xmlns:v="urn:schemas-microsoft-com:vml" xmlns:pvml="urn:schemas-microsoft-com:office:powerpoint" xmlns:com="http://schemas.openxmlformats.org/drawingml/2006/compatibility" xmlns:p14="http://schemas.microsoft.com/office/powerpoint/2010/main" xmlns:p15="http://schemas.microsoft.com/office/powerpoint/2012/main">
-  <p:cSld name="simple-dark-2">
+  <p:cSld name="simple-light-2">
     <p:bg>
       <p:bgPr>
         <a:solidFill>
@@ -5189,13 +5226,13 @@
                 <a:spcPts val="0"/>
               </a:spcAft>
               <a:buClr>
-                <a:schemeClr val="lt2"/>
+                <a:schemeClr val="dk2"/>
               </a:buClr>
               <a:buSzPts val="1800"/>
               <a:buChar char="●"/>
               <a:defRPr sz="1800">
                 <a:solidFill>
-                  <a:schemeClr val="lt2"/>
+                  <a:schemeClr val="dk2"/>
                 </a:solidFill>
               </a:defRPr>
             </a:lvl1pPr>
@@ -5210,13 +5247,13 @@
                 <a:spcPts val="0"/>
               </a:spcAft>
               <a:buClr>
-                <a:schemeClr val="lt2"/>
+                <a:schemeClr val="dk2"/>
               </a:buClr>
               <a:buSzPts val="1400"/>
               <a:buChar char="○"/>
               <a:defRPr>
                 <a:solidFill>
-                  <a:schemeClr val="lt2"/>
+                  <a:schemeClr val="dk2"/>
                 </a:solidFill>
               </a:defRPr>
             </a:lvl2pPr>
@@ -5231,13 +5268,13 @@
                 <a:spcPts val="0"/>
               </a:spcAft>
               <a:buClr>
-                <a:schemeClr val="lt2"/>
+                <a:schemeClr val="dk2"/>
               </a:buClr>
               <a:buSzPts val="1400"/>
               <a:buChar char="■"/>
               <a:defRPr>
                 <a:solidFill>
-                  <a:schemeClr val="lt2"/>
+                  <a:schemeClr val="dk2"/>
                 </a:solidFill>
               </a:defRPr>
             </a:lvl3pPr>
@@ -5252,13 +5289,13 @@
                 <a:spcPts val="0"/>
               </a:spcAft>
               <a:buClr>
-                <a:schemeClr val="lt2"/>
+                <a:schemeClr val="dk2"/>
               </a:buClr>
               <a:buSzPts val="1400"/>
               <a:buChar char="●"/>
               <a:defRPr>
                 <a:solidFill>
-                  <a:schemeClr val="lt2"/>
+                  <a:schemeClr val="dk2"/>
                 </a:solidFill>
               </a:defRPr>
             </a:lvl4pPr>
@@ -5273,13 +5310,13 @@
                 <a:spcPts val="0"/>
               </a:spcAft>
               <a:buClr>
-                <a:schemeClr val="lt2"/>
+                <a:schemeClr val="dk2"/>
               </a:buClr>
               <a:buSzPts val="1400"/>
               <a:buChar char="○"/>
               <a:defRPr>
                 <a:solidFill>
-                  <a:schemeClr val="lt2"/>
+                  <a:schemeClr val="dk2"/>
                 </a:solidFill>
               </a:defRPr>
             </a:lvl5pPr>
@@ -5294,13 +5331,13 @@
                 <a:spcPts val="0"/>
               </a:spcAft>
               <a:buClr>
-                <a:schemeClr val="lt2"/>
+                <a:schemeClr val="dk2"/>
               </a:buClr>
               <a:buSzPts val="1400"/>
               <a:buChar char="■"/>
               <a:defRPr>
                 <a:solidFill>
-                  <a:schemeClr val="lt2"/>
+                  <a:schemeClr val="dk2"/>
                 </a:solidFill>
               </a:defRPr>
             </a:lvl6pPr>
@@ -5315,13 +5352,13 @@
                 <a:spcPts val="0"/>
               </a:spcAft>
               <a:buClr>
-                <a:schemeClr val="lt2"/>
+                <a:schemeClr val="dk2"/>
               </a:buClr>
               <a:buSzPts val="1400"/>
               <a:buChar char="●"/>
               <a:defRPr>
                 <a:solidFill>
-                  <a:schemeClr val="lt2"/>
+                  <a:schemeClr val="dk2"/>
                 </a:solidFill>
               </a:defRPr>
             </a:lvl7pPr>
@@ -5336,13 +5373,13 @@
                 <a:spcPts val="0"/>
               </a:spcAft>
               <a:buClr>
-                <a:schemeClr val="lt2"/>
+                <a:schemeClr val="dk2"/>
               </a:buClr>
               <a:buSzPts val="1400"/>
               <a:buChar char="○"/>
               <a:defRPr>
                 <a:solidFill>
-                  <a:schemeClr val="lt2"/>
+                  <a:schemeClr val="dk2"/>
                 </a:solidFill>
               </a:defRPr>
             </a:lvl8pPr>
@@ -5357,13 +5394,13 @@
                 <a:spcPts val="1600"/>
               </a:spcAft>
               <a:buClr>
-                <a:schemeClr val="lt2"/>
+                <a:schemeClr val="dk2"/>
               </a:buClr>
               <a:buSzPts val="1400"/>
               <a:buChar char="■"/>
               <a:defRPr>
                 <a:solidFill>
-                  <a:schemeClr val="lt2"/>
+                  <a:schemeClr val="dk2"/>
                 </a:solidFill>
               </a:defRPr>
             </a:lvl9pPr>
@@ -5401,7 +5438,7 @@
               <a:buNone/>
               <a:defRPr sz="1000">
                 <a:solidFill>
-                  <a:schemeClr val="lt2"/>
+                  <a:schemeClr val="dk2"/>
                 </a:solidFill>
               </a:defRPr>
             </a:lvl1pPr>
@@ -5409,7 +5446,7 @@
               <a:buNone/>
               <a:defRPr sz="1000">
                 <a:solidFill>
-                  <a:schemeClr val="lt2"/>
+                  <a:schemeClr val="dk2"/>
                 </a:solidFill>
               </a:defRPr>
             </a:lvl2pPr>
@@ -5417,7 +5454,7 @@
               <a:buNone/>
               <a:defRPr sz="1000">
                 <a:solidFill>
-                  <a:schemeClr val="lt2"/>
+                  <a:schemeClr val="dk2"/>
                 </a:solidFill>
               </a:defRPr>
             </a:lvl3pPr>
@@ -5425,7 +5462,7 @@
               <a:buNone/>
               <a:defRPr sz="1000">
                 <a:solidFill>
-                  <a:schemeClr val="lt2"/>
+                  <a:schemeClr val="dk2"/>
                 </a:solidFill>
               </a:defRPr>
             </a:lvl4pPr>
@@ -5433,7 +5470,7 @@
               <a:buNone/>
               <a:defRPr sz="1000">
                 <a:solidFill>
-                  <a:schemeClr val="lt2"/>
+                  <a:schemeClr val="dk2"/>
                 </a:solidFill>
               </a:defRPr>
             </a:lvl5pPr>
@@ -5441,7 +5478,7 @@
               <a:buNone/>
               <a:defRPr sz="1000">
                 <a:solidFill>
-                  <a:schemeClr val="lt2"/>
+                  <a:schemeClr val="dk2"/>
                 </a:solidFill>
               </a:defRPr>
             </a:lvl6pPr>
@@ -5449,7 +5486,7 @@
               <a:buNone/>
               <a:defRPr sz="1000">
                 <a:solidFill>
-                  <a:schemeClr val="lt2"/>
+                  <a:schemeClr val="dk2"/>
                 </a:solidFill>
               </a:defRPr>
             </a:lvl7pPr>
@@ -5457,7 +5494,7 @@
               <a:buNone/>
               <a:defRPr sz="1000">
                 <a:solidFill>
-                  <a:schemeClr val="lt2"/>
+                  <a:schemeClr val="dk2"/>
                 </a:solidFill>
               </a:defRPr>
             </a:lvl8pPr>
@@ -5465,7 +5502,7 @@
               <a:buNone/>
               <a:defRPr sz="1000">
                 <a:solidFill>
-                  <a:schemeClr val="lt2"/>
+                  <a:schemeClr val="dk2"/>
                 </a:solidFill>
               </a:defRPr>
             </a:lvl9pPr>
@@ -6247,10 +6284,20 @@
               <a:buNone/>
             </a:pPr>
             <a:r>
-              <a:rPr lang="pl"/>
+              <a:rPr lang="pl">
+                <a:latin typeface="Times New Roman"/>
+                <a:ea typeface="Times New Roman"/>
+                <a:cs typeface="Times New Roman"/>
+                <a:sym typeface="Times New Roman"/>
+              </a:rPr>
               <a:t>Graf widoczności</a:t>
             </a:r>
-            <a:endParaRPr/>
+            <a:endParaRPr>
+              <a:latin typeface="Times New Roman"/>
+              <a:ea typeface="Times New Roman"/>
+              <a:cs typeface="Times New Roman"/>
+              <a:sym typeface="Times New Roman"/>
+            </a:endParaRPr>
           </a:p>
         </p:txBody>
       </p:sp>
@@ -6277,7 +6324,7 @@
           </a:bodyPr>
           <a:lstStyle/>
           <a:p>
-            <a:pPr indent="0" lvl="0" marL="0" rtl="0" algn="ctr">
+            <a:pPr indent="0" lvl="0" marL="0" rtl="0" algn="r">
               <a:spcBef>
                 <a:spcPts val="0"/>
               </a:spcBef>
@@ -6287,9 +6334,37 @@
               <a:buNone/>
             </a:pPr>
             <a:r>
-              <a:t/>
-            </a:r>
-            <a:endParaRPr/>
+              <a:rPr lang="pl" sz="1400">
+                <a:latin typeface="Times New Roman"/>
+                <a:ea typeface="Times New Roman"/>
+                <a:cs typeface="Times New Roman"/>
+                <a:sym typeface="Times New Roman"/>
+              </a:rPr>
+              <a:t>Przemysław Rożnawski</a:t>
+            </a:r>
+            <a:br>
+              <a:rPr lang="pl" sz="1400">
+                <a:latin typeface="Times New Roman"/>
+                <a:ea typeface="Times New Roman"/>
+                <a:cs typeface="Times New Roman"/>
+                <a:sym typeface="Times New Roman"/>
+              </a:rPr>
+            </a:br>
+            <a:r>
+              <a:rPr lang="pl" sz="1400">
+                <a:latin typeface="Times New Roman"/>
+                <a:ea typeface="Times New Roman"/>
+                <a:cs typeface="Times New Roman"/>
+                <a:sym typeface="Times New Roman"/>
+              </a:rPr>
+              <a:t>Kacper Karoń</a:t>
+            </a:r>
+            <a:endParaRPr sz="1400">
+              <a:latin typeface="Times New Roman"/>
+              <a:ea typeface="Times New Roman"/>
+              <a:cs typeface="Times New Roman"/>
+              <a:sym typeface="Times New Roman"/>
+            </a:endParaRPr>
           </a:p>
         </p:txBody>
       </p:sp>
@@ -6351,10 +6426,20 @@
               <a:buNone/>
             </a:pPr>
             <a:r>
-              <a:rPr lang="pl"/>
+              <a:rPr lang="pl">
+                <a:latin typeface="Times New Roman"/>
+                <a:ea typeface="Times New Roman"/>
+                <a:cs typeface="Times New Roman"/>
+                <a:sym typeface="Times New Roman"/>
+              </a:rPr>
               <a:t>Problem</a:t>
             </a:r>
-            <a:endParaRPr/>
+            <a:endParaRPr>
+              <a:latin typeface="Times New Roman"/>
+              <a:ea typeface="Times New Roman"/>
+              <a:cs typeface="Times New Roman"/>
+              <a:sym typeface="Times New Roman"/>
+            </a:endParaRPr>
           </a:p>
         </p:txBody>
       </p:sp>
@@ -6391,14 +6476,29 @@
               <a:buNone/>
             </a:pPr>
             <a:r>
-              <a:rPr lang="pl"/>
+              <a:rPr lang="pl">
+                <a:latin typeface="Times New Roman"/>
+                <a:ea typeface="Times New Roman"/>
+                <a:cs typeface="Times New Roman"/>
+                <a:sym typeface="Times New Roman"/>
+              </a:rPr>
               <a:t>Dla danego zbioru wielokątów </a:t>
             </a:r>
             <a:r>
-              <a:rPr lang="pl"/>
+              <a:rPr lang="pl">
+                <a:latin typeface="Times New Roman"/>
+                <a:ea typeface="Times New Roman"/>
+                <a:cs typeface="Times New Roman"/>
+                <a:sym typeface="Times New Roman"/>
+              </a:rPr>
               <a:t>zamkniętych podać dla każdego wierzchołka wszystkie widoczne z niego wierzchołki</a:t>
             </a:r>
-            <a:endParaRPr/>
+            <a:endParaRPr>
+              <a:latin typeface="Times New Roman"/>
+              <a:ea typeface="Times New Roman"/>
+              <a:cs typeface="Times New Roman"/>
+              <a:sym typeface="Times New Roman"/>
+            </a:endParaRPr>
           </a:p>
           <a:p>
             <a:pPr indent="0" lvl="0" marL="0" rtl="0" algn="l">
@@ -6504,18 +6604,38 @@
               <a:buNone/>
             </a:pPr>
             <a:r>
-              <a:rPr lang="pl"/>
+              <a:rPr lang="pl">
+                <a:latin typeface="Times New Roman"/>
+                <a:ea typeface="Times New Roman"/>
+                <a:cs typeface="Times New Roman"/>
+                <a:sym typeface="Times New Roman"/>
+              </a:rPr>
               <a:t>Algorytm </a:t>
             </a:r>
             <a:r>
-              <a:rPr lang="pl"/>
+              <a:rPr lang="pl">
+                <a:latin typeface="Times New Roman"/>
+                <a:ea typeface="Times New Roman"/>
+                <a:cs typeface="Times New Roman"/>
+                <a:sym typeface="Times New Roman"/>
+              </a:rPr>
               <a:t>znajdowania</a:t>
             </a:r>
             <a:r>
-              <a:rPr lang="pl"/>
+              <a:rPr lang="pl">
+                <a:latin typeface="Times New Roman"/>
+                <a:ea typeface="Times New Roman"/>
+                <a:cs typeface="Times New Roman"/>
+                <a:sym typeface="Times New Roman"/>
+              </a:rPr>
               <a:t> grafu widoczności</a:t>
             </a:r>
-            <a:endParaRPr/>
+            <a:endParaRPr>
+              <a:latin typeface="Times New Roman"/>
+              <a:ea typeface="Times New Roman"/>
+              <a:cs typeface="Times New Roman"/>
+              <a:sym typeface="Times New Roman"/>
+            </a:endParaRPr>
           </a:p>
         </p:txBody>
       </p:sp>
@@ -6553,13 +6673,33 @@
                 <a:spcPts val="0"/>
               </a:spcAft>
               <a:buSzPts val="1800"/>
+              <a:buFont typeface="Times New Roman"/>
               <a:buAutoNum type="arabicPeriod"/>
             </a:pPr>
             <a:r>
-              <a:rPr lang="pl"/>
-              <a:t>Stwórz pusty graf G</a:t>
-            </a:r>
-            <a:endParaRPr/>
+              <a:rPr lang="pl">
+                <a:latin typeface="Times New Roman"/>
+                <a:ea typeface="Times New Roman"/>
+                <a:cs typeface="Times New Roman"/>
+                <a:sym typeface="Times New Roman"/>
+              </a:rPr>
+              <a:t>Stwórz pusty graf </a:t>
+            </a:r>
+            <a:r>
+              <a:rPr i="1" lang="pl">
+                <a:latin typeface="Times New Roman"/>
+                <a:ea typeface="Times New Roman"/>
+                <a:cs typeface="Times New Roman"/>
+                <a:sym typeface="Times New Roman"/>
+              </a:rPr>
+              <a:t>G</a:t>
+            </a:r>
+            <a:endParaRPr i="1">
+              <a:latin typeface="Times New Roman"/>
+              <a:ea typeface="Times New Roman"/>
+              <a:cs typeface="Times New Roman"/>
+              <a:sym typeface="Times New Roman"/>
+            </a:endParaRPr>
           </a:p>
           <a:p>
             <a:pPr indent="-342900" lvl="0" marL="457200" rtl="0" algn="l">
@@ -6573,21 +6713,60 @@
                 <a:spcPts val="0"/>
               </a:spcAft>
               <a:buSzPts val="1800"/>
+              <a:buFont typeface="Times New Roman"/>
               <a:buAutoNum type="arabicPeriod"/>
             </a:pPr>
             <a:r>
-              <a:rPr lang="pl"/>
+              <a:rPr lang="pl">
+                <a:latin typeface="Times New Roman"/>
+                <a:ea typeface="Times New Roman"/>
+                <a:cs typeface="Times New Roman"/>
+                <a:sym typeface="Times New Roman"/>
+              </a:rPr>
               <a:t>Dla </a:t>
             </a:r>
             <a:r>
-              <a:rPr lang="pl"/>
+              <a:rPr lang="pl">
+                <a:latin typeface="Times New Roman"/>
+                <a:ea typeface="Times New Roman"/>
+                <a:cs typeface="Times New Roman"/>
+                <a:sym typeface="Times New Roman"/>
+              </a:rPr>
               <a:t>każdego</a:t>
             </a:r>
             <a:r>
-              <a:rPr lang="pl"/>
-              <a:t> wierzchołka V:</a:t>
-            </a:r>
-            <a:endParaRPr/>
+              <a:rPr lang="pl">
+                <a:latin typeface="Times New Roman"/>
+                <a:ea typeface="Times New Roman"/>
+                <a:cs typeface="Times New Roman"/>
+                <a:sym typeface="Times New Roman"/>
+              </a:rPr>
+              <a:t> wierzchołka </a:t>
+            </a:r>
+            <a:r>
+              <a:rPr i="1" lang="pl">
+                <a:latin typeface="Times New Roman"/>
+                <a:ea typeface="Times New Roman"/>
+                <a:cs typeface="Times New Roman"/>
+                <a:sym typeface="Times New Roman"/>
+              </a:rPr>
+              <a:t>v</a:t>
+            </a:r>
+            <a:r>
+              <a:rPr lang="pl">
+                <a:latin typeface="Times New Roman"/>
+                <a:ea typeface="Times New Roman"/>
+                <a:cs typeface="Times New Roman"/>
+                <a:sym typeface="Times New Roman"/>
+              </a:rPr>
+              <a:t>:</a:t>
+            </a:r>
+            <a:endParaRPr>
+              <a:latin typeface="Times New Roman"/>
+              <a:ea typeface="Times New Roman"/>
+              <a:cs typeface="Times New Roman"/>
+              <a:sym typeface="Times New Roman"/>
+            </a:endParaRPr>
           </a:p>
           <a:p>
             <a:pPr indent="-317500" lvl="1" marL="914400" rtl="0" algn="l">
@@ -6601,13 +6780,33 @@
                 <a:spcPts val="0"/>
               </a:spcAft>
               <a:buSzPts val="1400"/>
+              <a:buFont typeface="Times New Roman"/>
               <a:buAutoNum type="arabicPeriod"/>
             </a:pPr>
             <a:r>
-              <a:rPr lang="pl"/>
-              <a:t>Znajdź wszystkie wierzchołki widoczne z V</a:t>
-            </a:r>
-            <a:endParaRPr/>
+              <a:rPr lang="pl">
+                <a:latin typeface="Times New Roman"/>
+                <a:ea typeface="Times New Roman"/>
+                <a:cs typeface="Times New Roman"/>
+                <a:sym typeface="Times New Roman"/>
+              </a:rPr>
+              <a:t>Znajdź wszystkie wierzchołki widoczne z </a:t>
+            </a:r>
+            <a:r>
+              <a:rPr i="1" lang="pl">
+                <a:latin typeface="Times New Roman"/>
+                <a:ea typeface="Times New Roman"/>
+                <a:cs typeface="Times New Roman"/>
+                <a:sym typeface="Times New Roman"/>
+              </a:rPr>
+              <a:t>v</a:t>
+            </a:r>
+            <a:endParaRPr i="1">
+              <a:latin typeface="Times New Roman"/>
+              <a:ea typeface="Times New Roman"/>
+              <a:cs typeface="Times New Roman"/>
+              <a:sym typeface="Times New Roman"/>
+            </a:endParaRPr>
           </a:p>
           <a:p>
             <a:pPr indent="-317500" lvl="1" marL="914400" rtl="0" algn="l">
@@ -6621,21 +6820,96 @@
                 <a:spcPts val="0"/>
               </a:spcAft>
               <a:buSzPts val="1400"/>
+              <a:buFont typeface="Times New Roman"/>
               <a:buAutoNum type="arabicPeriod"/>
             </a:pPr>
             <a:r>
-              <a:rPr lang="pl"/>
+              <a:rPr lang="pl">
+                <a:latin typeface="Times New Roman"/>
+                <a:ea typeface="Times New Roman"/>
+                <a:cs typeface="Times New Roman"/>
+                <a:sym typeface="Times New Roman"/>
+              </a:rPr>
               <a:t>Dla każdego znalezionego </a:t>
             </a:r>
             <a:r>
-              <a:rPr lang="pl"/>
-              <a:t>wierzchołka U </a:t>
-            </a:r>
-            <a:r>
-              <a:rPr lang="pl"/>
-              <a:t> dodaj w grafie krawędź (V,U)</a:t>
-            </a:r>
-            <a:endParaRPr/>
+              <a:rPr lang="pl">
+                <a:latin typeface="Times New Roman"/>
+                <a:ea typeface="Times New Roman"/>
+                <a:cs typeface="Times New Roman"/>
+                <a:sym typeface="Times New Roman"/>
+              </a:rPr>
+              <a:t>wierzchołka </a:t>
+            </a:r>
+            <a:r>
+              <a:rPr i="1" lang="pl" u="sng">
+                <a:latin typeface="Times New Roman"/>
+                <a:ea typeface="Times New Roman"/>
+                <a:cs typeface="Times New Roman"/>
+                <a:sym typeface="Times New Roman"/>
+              </a:rPr>
+              <a:t>u</a:t>
+            </a:r>
+            <a:r>
+              <a:rPr lang="pl">
+                <a:latin typeface="Times New Roman"/>
+                <a:ea typeface="Times New Roman"/>
+                <a:cs typeface="Times New Roman"/>
+                <a:sym typeface="Times New Roman"/>
+              </a:rPr>
+              <a:t> </a:t>
+            </a:r>
+            <a:r>
+              <a:rPr lang="pl">
+                <a:latin typeface="Times New Roman"/>
+                <a:ea typeface="Times New Roman"/>
+                <a:cs typeface="Times New Roman"/>
+                <a:sym typeface="Times New Roman"/>
+              </a:rPr>
+              <a:t> dodaj w grafie krawędź (</a:t>
+            </a:r>
+            <a:r>
+              <a:rPr i="1" lang="pl">
+                <a:latin typeface="Times New Roman"/>
+                <a:ea typeface="Times New Roman"/>
+                <a:cs typeface="Times New Roman"/>
+                <a:sym typeface="Times New Roman"/>
+              </a:rPr>
+              <a:t>v</a:t>
+            </a:r>
+            <a:r>
+              <a:rPr lang="pl">
+                <a:latin typeface="Times New Roman"/>
+                <a:ea typeface="Times New Roman"/>
+                <a:cs typeface="Times New Roman"/>
+                <a:sym typeface="Times New Roman"/>
+              </a:rPr>
+              <a:t>,</a:t>
+            </a:r>
+            <a:r>
+              <a:rPr i="1" lang="pl">
+                <a:latin typeface="Times New Roman"/>
+                <a:ea typeface="Times New Roman"/>
+                <a:cs typeface="Times New Roman"/>
+                <a:sym typeface="Times New Roman"/>
+              </a:rPr>
+              <a:t>u</a:t>
+            </a:r>
+            <a:r>
+              <a:rPr lang="pl">
+                <a:latin typeface="Times New Roman"/>
+                <a:ea typeface="Times New Roman"/>
+                <a:cs typeface="Times New Roman"/>
+                <a:sym typeface="Times New Roman"/>
+              </a:rPr>
+              <a:t>)</a:t>
+            </a:r>
+            <a:endParaRPr>
+              <a:latin typeface="Times New Roman"/>
+              <a:ea typeface="Times New Roman"/>
+              <a:cs typeface="Times New Roman"/>
+              <a:sym typeface="Times New Roman"/>
+            </a:endParaRPr>
           </a:p>
           <a:p>
             <a:pPr indent="-342900" lvl="0" marL="457200" rtl="0" algn="l">
@@ -6649,13 +6923,33 @@
                 <a:spcPts val="0"/>
               </a:spcAft>
               <a:buSzPts val="1800"/>
+              <a:buFont typeface="Times New Roman"/>
               <a:buAutoNum type="arabicPeriod"/>
             </a:pPr>
             <a:r>
-              <a:rPr lang="pl"/>
-              <a:t>Zwróć graf G</a:t>
-            </a:r>
-            <a:endParaRPr/>
+              <a:rPr lang="pl">
+                <a:latin typeface="Times New Roman"/>
+                <a:ea typeface="Times New Roman"/>
+                <a:cs typeface="Times New Roman"/>
+                <a:sym typeface="Times New Roman"/>
+              </a:rPr>
+              <a:t>Zwróć graf </a:t>
+            </a:r>
+            <a:r>
+              <a:rPr i="1" lang="pl">
+                <a:latin typeface="Times New Roman"/>
+                <a:ea typeface="Times New Roman"/>
+                <a:cs typeface="Times New Roman"/>
+                <a:sym typeface="Times New Roman"/>
+              </a:rPr>
+              <a:t>G</a:t>
+            </a:r>
+            <a:endParaRPr i="1">
+              <a:latin typeface="Times New Roman"/>
+              <a:ea typeface="Times New Roman"/>
+              <a:cs typeface="Times New Roman"/>
+              <a:sym typeface="Times New Roman"/>
+            </a:endParaRPr>
           </a:p>
         </p:txBody>
       </p:sp>
@@ -6717,10 +7011,29 @@
               <a:buNone/>
             </a:pPr>
             <a:r>
-              <a:rPr lang="pl"/>
-              <a:t>Algorytm znajdowania wierzchołków widocznych z V</a:t>
-            </a:r>
-            <a:endParaRPr/>
+              <a:rPr lang="pl">
+                <a:latin typeface="Times New Roman"/>
+                <a:ea typeface="Times New Roman"/>
+                <a:cs typeface="Times New Roman"/>
+                <a:sym typeface="Times New Roman"/>
+              </a:rPr>
+              <a:t>Algorytm znajdowania wierzchołków widocznych z </a:t>
+            </a:r>
+            <a:r>
+              <a:rPr i="1" lang="pl">
+                <a:latin typeface="Times New Roman"/>
+                <a:ea typeface="Times New Roman"/>
+                <a:cs typeface="Times New Roman"/>
+                <a:sym typeface="Times New Roman"/>
+              </a:rPr>
+              <a:t>v</a:t>
+            </a:r>
+            <a:endParaRPr i="1">
+              <a:latin typeface="Times New Roman"/>
+              <a:ea typeface="Times New Roman"/>
+              <a:cs typeface="Times New Roman"/>
+              <a:sym typeface="Times New Roman"/>
+            </a:endParaRPr>
           </a:p>
         </p:txBody>
       </p:sp>
@@ -6735,7 +7048,7 @@
         <p:spPr>
           <a:xfrm>
             <a:off x="311700" y="1152475"/>
-            <a:ext cx="8520600" cy="3416400"/>
+            <a:ext cx="4444500" cy="3416400"/>
           </a:xfrm>
           <a:prstGeom prst="rect">
             <a:avLst/>
@@ -6747,7 +7060,7 @@
           </a:bodyPr>
           <a:lstStyle/>
           <a:p>
-            <a:pPr indent="-336550" lvl="0" marL="457200" rtl="0" algn="l">
+            <a:pPr indent="-317500" lvl="0" marL="457200" rtl="0" algn="l">
               <a:lnSpc>
                 <a:spcPct val="115000"/>
               </a:lnSpc>
@@ -6757,37 +7070,100 @@
               <a:spcAft>
                 <a:spcPts val="0"/>
               </a:spcAft>
-              <a:buSzPts val="1700"/>
+              <a:buSzPts val="1400"/>
+              <a:buFont typeface="Times New Roman"/>
               <a:buAutoNum type="arabicPeriod"/>
             </a:pPr>
             <a:r>
-              <a:rPr lang="pl" sz="1700"/>
-              <a:t>Posortuj kątowo z V wszystkie wierzchołki tworząc zbiór w</a:t>
-            </a:r>
-            <a:r>
-              <a:rPr baseline="-25000" lang="pl" sz="1700"/>
+              <a:rPr lang="pl" sz="1400">
+                <a:latin typeface="Times New Roman"/>
+                <a:ea typeface="Times New Roman"/>
+                <a:cs typeface="Times New Roman"/>
+                <a:sym typeface="Times New Roman"/>
+              </a:rPr>
+              <a:t>Posortuj kątowo z </a:t>
+            </a:r>
+            <a:r>
+              <a:rPr i="1" lang="pl" sz="1400">
+                <a:latin typeface="Times New Roman"/>
+                <a:ea typeface="Times New Roman"/>
+                <a:cs typeface="Times New Roman"/>
+                <a:sym typeface="Times New Roman"/>
+              </a:rPr>
+              <a:t>v</a:t>
+            </a:r>
+            <a:r>
+              <a:rPr lang="pl" sz="1400">
+                <a:latin typeface="Times New Roman"/>
+                <a:ea typeface="Times New Roman"/>
+                <a:cs typeface="Times New Roman"/>
+                <a:sym typeface="Times New Roman"/>
+              </a:rPr>
+              <a:t> wszystkie wierzchołki tworząc zbiór </a:t>
+            </a:r>
+            <a:r>
+              <a:rPr i="1" lang="pl" sz="1400">
+                <a:latin typeface="Times New Roman"/>
+                <a:ea typeface="Times New Roman"/>
+                <a:cs typeface="Times New Roman"/>
+                <a:sym typeface="Times New Roman"/>
+              </a:rPr>
+              <a:t>w</a:t>
+            </a:r>
+            <a:r>
+              <a:rPr baseline="-25000" i="1" lang="pl" sz="1400">
+                <a:latin typeface="Times New Roman"/>
+                <a:ea typeface="Times New Roman"/>
+                <a:cs typeface="Times New Roman"/>
+                <a:sym typeface="Times New Roman"/>
+              </a:rPr>
               <a:t>0</a:t>
             </a:r>
             <a:r>
-              <a:rPr lang="pl" sz="1700"/>
+              <a:rPr i="1" lang="pl" sz="1400">
+                <a:latin typeface="Times New Roman"/>
+                <a:ea typeface="Times New Roman"/>
+                <a:cs typeface="Times New Roman"/>
+                <a:sym typeface="Times New Roman"/>
+              </a:rPr>
               <a:t>,w</a:t>
             </a:r>
             <a:r>
-              <a:rPr baseline="-25000" lang="pl" sz="1700"/>
+              <a:rPr baseline="-25000" i="1" lang="pl" sz="1400">
+                <a:latin typeface="Times New Roman"/>
+                <a:ea typeface="Times New Roman"/>
+                <a:cs typeface="Times New Roman"/>
+                <a:sym typeface="Times New Roman"/>
+              </a:rPr>
               <a:t>1</a:t>
             </a:r>
             <a:r>
-              <a:rPr lang="pl" sz="1700"/>
-              <a:t>,...,w</a:t>
-            </a:r>
-            <a:r>
-              <a:rPr baseline="-25000" lang="pl" sz="1700"/>
+              <a:rPr i="1" lang="pl" sz="1400">
+                <a:latin typeface="Times New Roman"/>
+                <a:ea typeface="Times New Roman"/>
+                <a:cs typeface="Times New Roman"/>
+                <a:sym typeface="Times New Roman"/>
+              </a:rPr>
+              <a:t>, … ,w</a:t>
+            </a:r>
+            <a:r>
+              <a:rPr baseline="-25000" i="1" lang="pl" sz="1400">
+                <a:latin typeface="Times New Roman"/>
+                <a:ea typeface="Times New Roman"/>
+                <a:cs typeface="Times New Roman"/>
+                <a:sym typeface="Times New Roman"/>
+              </a:rPr>
               <a:t>n</a:t>
             </a:r>
-            <a:endParaRPr baseline="-25000" sz="1700"/>
+            <a:endParaRPr baseline="-25000" i="1" sz="1400">
+              <a:latin typeface="Times New Roman"/>
+              <a:ea typeface="Times New Roman"/>
+              <a:cs typeface="Times New Roman"/>
+              <a:sym typeface="Times New Roman"/>
+            </a:endParaRPr>
           </a:p>
           <a:p>
-            <a:pPr indent="-336550" lvl="0" marL="457200" rtl="0" algn="l">
+            <a:pPr indent="-317500" lvl="0" marL="457200" rtl="0" algn="l">
               <a:lnSpc>
                 <a:spcPct val="115000"/>
               </a:lnSpc>
@@ -6797,25 +7173,64 @@
               <a:spcAft>
                 <a:spcPts val="0"/>
               </a:spcAft>
-              <a:buSzPts val="1700"/>
+              <a:buSzPts val="1400"/>
+              <a:buFont typeface="Times New Roman"/>
               <a:buAutoNum type="arabicPeriod"/>
             </a:pPr>
             <a:r>
-              <a:rPr lang="pl" sz="1700"/>
-              <a:t>Znajdź wszystkie odcinki przecinane przez półprostą (V, w</a:t>
-            </a:r>
-            <a:r>
-              <a:rPr baseline="-25000" lang="pl" sz="1700"/>
+              <a:rPr lang="pl" sz="1400">
+                <a:latin typeface="Times New Roman"/>
+                <a:ea typeface="Times New Roman"/>
+                <a:cs typeface="Times New Roman"/>
+                <a:sym typeface="Times New Roman"/>
+              </a:rPr>
+              <a:t>Znajdź wszystkie odcinki przecinane przez półprostą (</a:t>
+            </a:r>
+            <a:r>
+              <a:rPr i="1" lang="pl" sz="1400">
+                <a:latin typeface="Times New Roman"/>
+                <a:ea typeface="Times New Roman"/>
+                <a:cs typeface="Times New Roman"/>
+                <a:sym typeface="Times New Roman"/>
+              </a:rPr>
+              <a:t>V, w</a:t>
+            </a:r>
+            <a:r>
+              <a:rPr baseline="-25000" i="1" lang="pl" sz="1400">
+                <a:latin typeface="Times New Roman"/>
+                <a:ea typeface="Times New Roman"/>
+                <a:cs typeface="Times New Roman"/>
+                <a:sym typeface="Times New Roman"/>
+              </a:rPr>
               <a:t>0</a:t>
             </a:r>
             <a:r>
-              <a:rPr lang="pl" sz="1700"/>
-              <a:t>), dodaj je do zbalansowanego drzewa T</a:t>
-            </a:r>
-            <a:endParaRPr sz="1700"/>
+              <a:rPr lang="pl" sz="1400">
+                <a:latin typeface="Times New Roman"/>
+                <a:ea typeface="Times New Roman"/>
+                <a:cs typeface="Times New Roman"/>
+                <a:sym typeface="Times New Roman"/>
+              </a:rPr>
+              <a:t>), dodaj je do zbalansowanego drzewa </a:t>
+            </a:r>
+            <a:r>
+              <a:rPr i="1" lang="pl" sz="1400">
+                <a:latin typeface="Times New Roman"/>
+                <a:ea typeface="Times New Roman"/>
+                <a:cs typeface="Times New Roman"/>
+                <a:sym typeface="Times New Roman"/>
+              </a:rPr>
+              <a:t>T</a:t>
+            </a:r>
+            <a:endParaRPr i="1" sz="1400">
+              <a:latin typeface="Times New Roman"/>
+              <a:ea typeface="Times New Roman"/>
+              <a:cs typeface="Times New Roman"/>
+              <a:sym typeface="Times New Roman"/>
+            </a:endParaRPr>
           </a:p>
           <a:p>
-            <a:pPr indent="-336550" lvl="0" marL="457200" rtl="0" algn="l">
+            <a:pPr indent="-317500" lvl="0" marL="457200" rtl="0" algn="l">
               <a:lnSpc>
                 <a:spcPct val="115000"/>
               </a:lnSpc>
@@ -6825,17 +7240,55 @@
               <a:spcAft>
                 <a:spcPts val="0"/>
               </a:spcAft>
-              <a:buSzPts val="1700"/>
+              <a:buSzPts val="1400"/>
+              <a:buFont typeface="Times New Roman"/>
               <a:buAutoNum type="arabicPeriod"/>
             </a:pPr>
             <a:r>
-              <a:rPr lang="pl" sz="1700"/>
-              <a:t>Stwórz pusty zbiór W wierzchołków widocznych z V</a:t>
-            </a:r>
-            <a:endParaRPr sz="1700"/>
+              <a:rPr lang="pl" sz="1400">
+                <a:latin typeface="Times New Roman"/>
+                <a:ea typeface="Times New Roman"/>
+                <a:cs typeface="Times New Roman"/>
+                <a:sym typeface="Times New Roman"/>
+              </a:rPr>
+              <a:t>Stwórz pusty zbiór </a:t>
+            </a:r>
+            <a:r>
+              <a:rPr i="1" lang="pl" sz="1400">
+                <a:latin typeface="Times New Roman"/>
+                <a:ea typeface="Times New Roman"/>
+                <a:cs typeface="Times New Roman"/>
+                <a:sym typeface="Times New Roman"/>
+              </a:rPr>
+              <a:t>W</a:t>
+            </a:r>
+            <a:r>
+              <a:rPr lang="pl" sz="1400">
+                <a:latin typeface="Times New Roman"/>
+                <a:ea typeface="Times New Roman"/>
+                <a:cs typeface="Times New Roman"/>
+                <a:sym typeface="Times New Roman"/>
+              </a:rPr>
+              <a:t> wierzchołków widocznych z </a:t>
+            </a:r>
+            <a:r>
+              <a:rPr i="1" lang="pl" sz="1400">
+                <a:latin typeface="Times New Roman"/>
+                <a:ea typeface="Times New Roman"/>
+                <a:cs typeface="Times New Roman"/>
+                <a:sym typeface="Times New Roman"/>
+              </a:rPr>
+              <a:t>v</a:t>
+            </a:r>
+            <a:endParaRPr i="1" sz="1400">
+              <a:latin typeface="Times New Roman"/>
+              <a:ea typeface="Times New Roman"/>
+              <a:cs typeface="Times New Roman"/>
+              <a:sym typeface="Times New Roman"/>
+            </a:endParaRPr>
           </a:p>
           <a:p>
-            <a:pPr indent="-336550" lvl="0" marL="457200" rtl="0" algn="l">
+            <a:pPr indent="-317500" lvl="0" marL="457200" rtl="0" algn="l">
               <a:lnSpc>
                 <a:spcPct val="115000"/>
               </a:lnSpc>
@@ -6845,53 +7298,109 @@
               <a:spcAft>
                 <a:spcPts val="0"/>
               </a:spcAft>
-              <a:buSzPts val="1700"/>
+              <a:buSzPts val="1400"/>
+              <a:buFont typeface="Times New Roman"/>
               <a:buAutoNum type="arabicPeriod"/>
             </a:pPr>
             <a:r>
-              <a:rPr lang="pl" sz="1700"/>
+              <a:rPr lang="pl" sz="1400">
+                <a:latin typeface="Times New Roman"/>
+                <a:ea typeface="Times New Roman"/>
+                <a:cs typeface="Times New Roman"/>
+                <a:sym typeface="Times New Roman"/>
+              </a:rPr>
               <a:t>Dla każdego </a:t>
             </a:r>
             <a:r>
-              <a:rPr lang="pl" sz="1700"/>
+              <a:rPr lang="pl" sz="1400">
+                <a:latin typeface="Times New Roman"/>
+                <a:ea typeface="Times New Roman"/>
+                <a:cs typeface="Times New Roman"/>
+                <a:sym typeface="Times New Roman"/>
+              </a:rPr>
               <a:t>wierzchołka</a:t>
             </a:r>
             <a:r>
-              <a:rPr lang="pl" sz="1700"/>
+              <a:rPr i="1" lang="pl" sz="1400">
+                <a:latin typeface="Times New Roman"/>
+                <a:ea typeface="Times New Roman"/>
+                <a:cs typeface="Times New Roman"/>
+                <a:sym typeface="Times New Roman"/>
+              </a:rPr>
               <a:t> </a:t>
             </a:r>
             <a:r>
-              <a:rPr lang="pl" sz="1700"/>
+              <a:rPr i="1" lang="pl" sz="1400">
+                <a:latin typeface="Times New Roman"/>
+                <a:ea typeface="Times New Roman"/>
+                <a:cs typeface="Times New Roman"/>
+                <a:sym typeface="Times New Roman"/>
+              </a:rPr>
               <a:t>w</a:t>
             </a:r>
             <a:r>
-              <a:rPr baseline="-25000" lang="pl" sz="1700"/>
+              <a:rPr baseline="-25000" i="1" lang="pl" sz="1400">
+                <a:latin typeface="Times New Roman"/>
+                <a:ea typeface="Times New Roman"/>
+                <a:cs typeface="Times New Roman"/>
+                <a:sym typeface="Times New Roman"/>
+              </a:rPr>
               <a:t>0</a:t>
             </a:r>
             <a:r>
-              <a:rPr lang="pl" sz="1700"/>
+              <a:rPr i="1" lang="pl" sz="1400">
+                <a:latin typeface="Times New Roman"/>
+                <a:ea typeface="Times New Roman"/>
+                <a:cs typeface="Times New Roman"/>
+                <a:sym typeface="Times New Roman"/>
+              </a:rPr>
               <a:t>,w</a:t>
             </a:r>
             <a:r>
-              <a:rPr baseline="-25000" lang="pl" sz="1700"/>
+              <a:rPr baseline="-25000" i="1" lang="pl" sz="1400">
+                <a:latin typeface="Times New Roman"/>
+                <a:ea typeface="Times New Roman"/>
+                <a:cs typeface="Times New Roman"/>
+                <a:sym typeface="Times New Roman"/>
+              </a:rPr>
               <a:t>1</a:t>
             </a:r>
             <a:r>
-              <a:rPr lang="pl" sz="1700"/>
+              <a:rPr i="1" lang="pl" sz="1400">
+                <a:latin typeface="Times New Roman"/>
+                <a:ea typeface="Times New Roman"/>
+                <a:cs typeface="Times New Roman"/>
+                <a:sym typeface="Times New Roman"/>
+              </a:rPr>
               <a:t>,...,w</a:t>
             </a:r>
             <a:r>
-              <a:rPr baseline="-25000" lang="pl" sz="1700"/>
+              <a:rPr baseline="-25000" i="1" lang="pl" sz="1400">
+                <a:latin typeface="Times New Roman"/>
+                <a:ea typeface="Times New Roman"/>
+                <a:cs typeface="Times New Roman"/>
+                <a:sym typeface="Times New Roman"/>
+              </a:rPr>
               <a:t>n </a:t>
             </a:r>
             <a:r>
-              <a:rPr lang="pl" sz="1700"/>
+              <a:rPr lang="pl" sz="1400">
+                <a:latin typeface="Times New Roman"/>
+                <a:ea typeface="Times New Roman"/>
+                <a:cs typeface="Times New Roman"/>
+                <a:sym typeface="Times New Roman"/>
+              </a:rPr>
               <a:t>:</a:t>
             </a:r>
-            <a:endParaRPr sz="1700"/>
+            <a:endParaRPr sz="1400">
+              <a:latin typeface="Times New Roman"/>
+              <a:ea typeface="Times New Roman"/>
+              <a:cs typeface="Times New Roman"/>
+              <a:sym typeface="Times New Roman"/>
+            </a:endParaRPr>
           </a:p>
           <a:p>
-            <a:pPr indent="-330200" lvl="1" marL="914400" rtl="0" algn="l">
+            <a:pPr indent="-317500" lvl="1" marL="914400" rtl="0" algn="l">
               <a:lnSpc>
                 <a:spcPct val="115000"/>
               </a:lnSpc>
@@ -6901,25 +7410,64 @@
               <a:spcAft>
                 <a:spcPts val="0"/>
               </a:spcAft>
-              <a:buSzPts val="1600"/>
+              <a:buSzPts val="1400"/>
+              <a:buFont typeface="Times New Roman"/>
               <a:buAutoNum type="arabicPeriod"/>
             </a:pPr>
             <a:r>
-              <a:rPr lang="pl" sz="1600"/>
+              <a:rPr lang="pl">
+                <a:latin typeface="Times New Roman"/>
+                <a:ea typeface="Times New Roman"/>
+                <a:cs typeface="Times New Roman"/>
+                <a:sym typeface="Times New Roman"/>
+              </a:rPr>
               <a:t>Jeśli w</a:t>
             </a:r>
             <a:r>
-              <a:rPr baseline="-25000" lang="pl" sz="1600"/>
+              <a:rPr baseline="-25000" lang="pl">
+                <a:latin typeface="Times New Roman"/>
+                <a:ea typeface="Times New Roman"/>
+                <a:cs typeface="Times New Roman"/>
+                <a:sym typeface="Times New Roman"/>
+              </a:rPr>
               <a:t>i</a:t>
             </a:r>
             <a:r>
-              <a:rPr lang="pl" sz="1600"/>
-              <a:t> widoczny z V dodaj go do zbioru W</a:t>
-            </a:r>
-            <a:endParaRPr sz="1600"/>
+              <a:rPr lang="pl">
+                <a:latin typeface="Times New Roman"/>
+                <a:ea typeface="Times New Roman"/>
+                <a:cs typeface="Times New Roman"/>
+                <a:sym typeface="Times New Roman"/>
+              </a:rPr>
+              <a:t> widoczny z </a:t>
+            </a:r>
+            <a:r>
+              <a:rPr i="1" lang="pl">
+                <a:latin typeface="Times New Roman"/>
+                <a:ea typeface="Times New Roman"/>
+                <a:cs typeface="Times New Roman"/>
+                <a:sym typeface="Times New Roman"/>
+              </a:rPr>
+              <a:t>v </a:t>
+            </a:r>
+            <a:r>
+              <a:rPr lang="pl">
+                <a:latin typeface="Times New Roman"/>
+                <a:ea typeface="Times New Roman"/>
+                <a:cs typeface="Times New Roman"/>
+                <a:sym typeface="Times New Roman"/>
+              </a:rPr>
+              <a:t>dodaj go do zbioru W</a:t>
+            </a:r>
+            <a:endParaRPr>
+              <a:latin typeface="Times New Roman"/>
+              <a:ea typeface="Times New Roman"/>
+              <a:cs typeface="Times New Roman"/>
+              <a:sym typeface="Times New Roman"/>
+            </a:endParaRPr>
           </a:p>
           <a:p>
-            <a:pPr indent="-330200" lvl="1" marL="914400" rtl="0" algn="l">
+            <a:pPr indent="-317500" lvl="1" marL="914400" rtl="0" algn="l">
               <a:lnSpc>
                 <a:spcPct val="115000"/>
               </a:lnSpc>
@@ -6929,33 +7477,82 @@
               <a:spcAft>
                 <a:spcPts val="0"/>
               </a:spcAft>
-              <a:buSzPts val="1600"/>
+              <a:buSzPts val="1400"/>
+              <a:buFont typeface="Times New Roman"/>
               <a:buAutoNum type="arabicPeriod"/>
             </a:pPr>
             <a:r>
-              <a:rPr lang="pl" sz="1600"/>
-              <a:t>Dodaj do T wszystkie krawędzie kończące się w w</a:t>
-            </a:r>
-            <a:r>
-              <a:rPr baseline="-25000" lang="pl" sz="1600"/>
+              <a:rPr lang="pl">
+                <a:latin typeface="Times New Roman"/>
+                <a:ea typeface="Times New Roman"/>
+                <a:cs typeface="Times New Roman"/>
+                <a:sym typeface="Times New Roman"/>
+              </a:rPr>
+              <a:t>Dodaj do T wszystkie krawędzie kończące się w </a:t>
+            </a:r>
+            <a:r>
+              <a:rPr i="1" lang="pl">
+                <a:latin typeface="Times New Roman"/>
+                <a:ea typeface="Times New Roman"/>
+                <a:cs typeface="Times New Roman"/>
+                <a:sym typeface="Times New Roman"/>
+              </a:rPr>
+              <a:t>w</a:t>
+            </a:r>
+            <a:r>
+              <a:rPr baseline="-25000" i="1" lang="pl">
+                <a:latin typeface="Times New Roman"/>
+                <a:ea typeface="Times New Roman"/>
+                <a:cs typeface="Times New Roman"/>
+                <a:sym typeface="Times New Roman"/>
+              </a:rPr>
+              <a:t>i </a:t>
+            </a:r>
+            <a:r>
+              <a:rPr lang="pl">
+                <a:latin typeface="Times New Roman"/>
+                <a:ea typeface="Times New Roman"/>
+                <a:cs typeface="Times New Roman"/>
+                <a:sym typeface="Times New Roman"/>
+              </a:rPr>
+              <a:t>, które leżą ‘na prawo’ od półprostej  (</a:t>
+            </a:r>
+            <a:r>
+              <a:rPr i="1" lang="pl">
+                <a:latin typeface="Times New Roman"/>
+                <a:ea typeface="Times New Roman"/>
+                <a:cs typeface="Times New Roman"/>
+                <a:sym typeface="Times New Roman"/>
+              </a:rPr>
+              <a:t>v, w</a:t>
+            </a:r>
+            <a:r>
+              <a:rPr baseline="-25000" i="1" lang="pl">
+                <a:latin typeface="Times New Roman"/>
+                <a:ea typeface="Times New Roman"/>
+                <a:cs typeface="Times New Roman"/>
+                <a:sym typeface="Times New Roman"/>
+              </a:rPr>
               <a:t>i</a:t>
             </a:r>
             <a:r>
-              <a:rPr lang="pl" sz="1600"/>
-              <a:t>, które leżą ‘na prawo’ od półprostej  (V, w</a:t>
-            </a:r>
-            <a:r>
-              <a:rPr baseline="-25000" lang="pl" sz="1600"/>
-              <a:t>i</a:t>
-            </a:r>
-            <a:r>
-              <a:rPr lang="pl" sz="1600"/>
+              <a:rPr lang="pl">
+                <a:latin typeface="Times New Roman"/>
+                <a:ea typeface="Times New Roman"/>
+                <a:cs typeface="Times New Roman"/>
+                <a:sym typeface="Times New Roman"/>
+              </a:rPr>
               <a:t>)</a:t>
             </a:r>
-            <a:endParaRPr sz="1600"/>
+            <a:endParaRPr>
+              <a:latin typeface="Times New Roman"/>
+              <a:ea typeface="Times New Roman"/>
+              <a:cs typeface="Times New Roman"/>
+              <a:sym typeface="Times New Roman"/>
+            </a:endParaRPr>
           </a:p>
           <a:p>
-            <a:pPr indent="-330200" lvl="1" marL="914400" rtl="0" algn="l">
+            <a:pPr indent="-317500" lvl="1" marL="914400" rtl="0" algn="l">
               <a:lnSpc>
                 <a:spcPct val="115000"/>
               </a:lnSpc>
@@ -6965,33 +7562,91 @@
               <a:spcAft>
                 <a:spcPts val="0"/>
               </a:spcAft>
-              <a:buSzPts val="1600"/>
+              <a:buSzPts val="1400"/>
+              <a:buFont typeface="Times New Roman"/>
               <a:buAutoNum type="arabicPeriod"/>
             </a:pPr>
             <a:r>
-              <a:rPr lang="pl" sz="1600"/>
-              <a:t>Usuń z T wszystkie krawędzie kończące się w w</a:t>
-            </a:r>
-            <a:r>
-              <a:rPr baseline="-25000" lang="pl" sz="1600"/>
+              <a:rPr lang="pl">
+                <a:latin typeface="Times New Roman"/>
+                <a:ea typeface="Times New Roman"/>
+                <a:cs typeface="Times New Roman"/>
+                <a:sym typeface="Times New Roman"/>
+              </a:rPr>
+              <a:t>Usuń z </a:t>
+            </a:r>
+            <a:r>
+              <a:rPr i="1" lang="pl">
+                <a:latin typeface="Times New Roman"/>
+                <a:ea typeface="Times New Roman"/>
+                <a:cs typeface="Times New Roman"/>
+                <a:sym typeface="Times New Roman"/>
+              </a:rPr>
+              <a:t>T </a:t>
+            </a:r>
+            <a:r>
+              <a:rPr lang="pl">
+                <a:latin typeface="Times New Roman"/>
+                <a:ea typeface="Times New Roman"/>
+                <a:cs typeface="Times New Roman"/>
+                <a:sym typeface="Times New Roman"/>
+              </a:rPr>
+              <a:t>wszystkie krawędzie kończące się w w</a:t>
+            </a:r>
+            <a:r>
+              <a:rPr baseline="-25000" lang="pl">
+                <a:latin typeface="Times New Roman"/>
+                <a:ea typeface="Times New Roman"/>
+                <a:cs typeface="Times New Roman"/>
+                <a:sym typeface="Times New Roman"/>
+              </a:rPr>
               <a:t>i</a:t>
             </a:r>
             <a:r>
-              <a:rPr lang="pl" sz="1600"/>
-              <a:t>, które leżą ‘na lewo’ od półprostej    (V, w</a:t>
-            </a:r>
-            <a:r>
-              <a:rPr baseline="-25000" lang="pl" sz="1600"/>
+              <a:rPr lang="pl">
+                <a:latin typeface="Times New Roman"/>
+                <a:ea typeface="Times New Roman"/>
+                <a:cs typeface="Times New Roman"/>
+                <a:sym typeface="Times New Roman"/>
+              </a:rPr>
+              <a:t>, które leżą ‘na lewo’ od półprostej    (</a:t>
+            </a:r>
+            <a:r>
+              <a:rPr i="1" lang="pl">
+                <a:latin typeface="Times New Roman"/>
+                <a:ea typeface="Times New Roman"/>
+                <a:cs typeface="Times New Roman"/>
+                <a:sym typeface="Times New Roman"/>
+              </a:rPr>
+              <a:t>v, w</a:t>
+            </a:r>
+            <a:r>
+              <a:rPr baseline="-25000" i="1" lang="pl">
+                <a:latin typeface="Times New Roman"/>
+                <a:ea typeface="Times New Roman"/>
+                <a:cs typeface="Times New Roman"/>
+                <a:sym typeface="Times New Roman"/>
+              </a:rPr>
               <a:t>i</a:t>
             </a:r>
             <a:r>
-              <a:rPr lang="pl" sz="1600"/>
+              <a:rPr lang="pl">
+                <a:latin typeface="Times New Roman"/>
+                <a:ea typeface="Times New Roman"/>
+                <a:cs typeface="Times New Roman"/>
+                <a:sym typeface="Times New Roman"/>
+              </a:rPr>
               <a:t>)</a:t>
             </a:r>
-            <a:endParaRPr sz="1600"/>
+            <a:endParaRPr>
+              <a:latin typeface="Times New Roman"/>
+              <a:ea typeface="Times New Roman"/>
+              <a:cs typeface="Times New Roman"/>
+              <a:sym typeface="Times New Roman"/>
+            </a:endParaRPr>
           </a:p>
           <a:p>
-            <a:pPr indent="-336550" lvl="0" marL="457200" rtl="0" algn="l">
+            <a:pPr indent="-317500" lvl="0" marL="457200" rtl="0" algn="l">
               <a:lnSpc>
                 <a:spcPct val="115000"/>
               </a:lnSpc>
@@ -7001,17 +7656,65 @@
               <a:spcAft>
                 <a:spcPts val="0"/>
               </a:spcAft>
-              <a:buSzPts val="1700"/>
+              <a:buSzPts val="1400"/>
+              <a:buFont typeface="Times New Roman"/>
               <a:buAutoNum type="arabicPeriod"/>
             </a:pPr>
             <a:r>
-              <a:rPr lang="pl" sz="1700"/>
-              <a:t>Zwróć W</a:t>
-            </a:r>
-            <a:endParaRPr sz="1700"/>
+              <a:rPr lang="pl" sz="1400">
+                <a:latin typeface="Times New Roman"/>
+                <a:ea typeface="Times New Roman"/>
+                <a:cs typeface="Times New Roman"/>
+                <a:sym typeface="Times New Roman"/>
+              </a:rPr>
+              <a:t>Zwróć </a:t>
+            </a:r>
+            <a:r>
+              <a:rPr i="1" lang="pl" sz="1400">
+                <a:latin typeface="Times New Roman"/>
+                <a:ea typeface="Times New Roman"/>
+                <a:cs typeface="Times New Roman"/>
+                <a:sym typeface="Times New Roman"/>
+              </a:rPr>
+              <a:t>W</a:t>
+            </a:r>
+            <a:endParaRPr i="1" sz="1400">
+              <a:latin typeface="Times New Roman"/>
+              <a:ea typeface="Times New Roman"/>
+              <a:cs typeface="Times New Roman"/>
+              <a:sym typeface="Times New Roman"/>
+            </a:endParaRPr>
           </a:p>
         </p:txBody>
       </p:sp>
+      <p:pic>
+        <p:nvPicPr>
+          <p:cNvPr id="75" name="Google Shape;75;p16"/>
+          <p:cNvPicPr preferRelativeResize="0"/>
+          <p:nvPr/>
+        </p:nvPicPr>
+        <p:blipFill>
+          <a:blip r:embed="rId3">
+            <a:alphaModFix/>
+          </a:blip>
+          <a:stretch>
+            <a:fillRect/>
+          </a:stretch>
+        </p:blipFill>
+        <p:spPr>
+          <a:xfrm>
+            <a:off x="4756200" y="1152475"/>
+            <a:ext cx="4105275" cy="3581400"/>
+          </a:xfrm>
+          <a:prstGeom prst="rect">
+            <a:avLst/>
+          </a:prstGeom>
+          <a:noFill/>
+          <a:ln>
+            <a:noFill/>
+          </a:ln>
+        </p:spPr>
+      </p:pic>
     </p:spTree>
   </p:cSld>
   <p:clrMapOvr>
@@ -7025,7 +7728,7 @@
   <p:cSld>
     <p:spTree>
       <p:nvGrpSpPr>
-        <p:cNvPr id="78" name="Shape 78"/>
+        <p:cNvPr id="79" name="Shape 79"/>
         <p:cNvGrpSpPr/>
         <p:nvPr/>
       </p:nvGrpSpPr>
@@ -7039,16 +7742,16 @@
       </p:grpSpPr>
       <p:sp>
         <p:nvSpPr>
-          <p:cNvPr id="79" name="Google Shape;79;p17"/>
+          <p:cNvPr id="80" name="Google Shape;80;p17"/>
           <p:cNvSpPr txBox="1"/>
           <p:nvPr>
-            <p:ph idx="1" type="body"/>
+            <p:ph type="title"/>
           </p:nvPr>
         </p:nvSpPr>
         <p:spPr>
           <a:xfrm>
-            <a:off x="311700" y="1152475"/>
-            <a:ext cx="8520600" cy="3416400"/>
+            <a:off x="311700" y="445025"/>
+            <a:ext cx="8520600" cy="572700"/>
           </a:xfrm>
           <a:prstGeom prst="rect">
             <a:avLst/>
@@ -7065,20 +7768,761 @@
                 <a:spcPts val="0"/>
               </a:spcBef>
               <a:spcAft>
-                <a:spcPts val="1600"/>
+                <a:spcPts val="0"/>
               </a:spcAft>
               <a:buNone/>
             </a:pPr>
             <a:r>
-              <a:t/>
-            </a:r>
-            <a:endParaRPr/>
+              <a:rPr lang="pl">
+                <a:latin typeface="Times New Roman"/>
+                <a:ea typeface="Times New Roman"/>
+                <a:cs typeface="Times New Roman"/>
+                <a:sym typeface="Times New Roman"/>
+              </a:rPr>
+              <a:t>Algorytm określający widoczność wierzchołka w</a:t>
+            </a:r>
+            <a:r>
+              <a:rPr baseline="-25000" lang="pl">
+                <a:latin typeface="Times New Roman"/>
+                <a:ea typeface="Times New Roman"/>
+                <a:cs typeface="Times New Roman"/>
+                <a:sym typeface="Times New Roman"/>
+              </a:rPr>
+              <a:t>i</a:t>
+            </a:r>
+            <a:endParaRPr>
+              <a:latin typeface="Times New Roman"/>
+              <a:ea typeface="Times New Roman"/>
+              <a:cs typeface="Times New Roman"/>
+              <a:sym typeface="Times New Roman"/>
+            </a:endParaRPr>
+          </a:p>
+        </p:txBody>
+      </p:sp>
+      <p:sp>
+        <p:nvSpPr>
+          <p:cNvPr id="81" name="Google Shape;81;p17"/>
+          <p:cNvSpPr txBox="1"/>
+          <p:nvPr>
+            <p:ph idx="1" type="body"/>
+          </p:nvPr>
+        </p:nvSpPr>
+        <p:spPr>
+          <a:xfrm>
+            <a:off x="311700" y="1152475"/>
+            <a:ext cx="4663500" cy="3874500"/>
+          </a:xfrm>
+          <a:prstGeom prst="rect">
+            <a:avLst/>
+          </a:prstGeom>
+        </p:spPr>
+        <p:txBody>
+          <a:bodyPr anchorCtr="0" anchor="t" bIns="91425" lIns="91425" spcFirstLastPara="1" rIns="91425" wrap="square" tIns="91425">
+            <a:noAutofit/>
+          </a:bodyPr>
+          <a:lstStyle/>
+          <a:p>
+            <a:pPr indent="-317500" lvl="0" marL="457200" rtl="0" algn="l">
+              <a:lnSpc>
+                <a:spcPct val="115000"/>
+              </a:lnSpc>
+              <a:spcBef>
+                <a:spcPts val="0"/>
+              </a:spcBef>
+              <a:spcAft>
+                <a:spcPts val="0"/>
+              </a:spcAft>
+              <a:buSzPts val="1400"/>
+              <a:buFont typeface="Times New Roman"/>
+              <a:buAutoNum type="arabicPeriod"/>
+            </a:pPr>
+            <a:r>
+              <a:rPr lang="pl" sz="1400">
+                <a:latin typeface="Times New Roman"/>
+                <a:ea typeface="Times New Roman"/>
+                <a:cs typeface="Times New Roman"/>
+                <a:sym typeface="Times New Roman"/>
+              </a:rPr>
+              <a:t>Jeśli (</a:t>
+            </a:r>
+            <a:r>
+              <a:rPr i="1" lang="pl" sz="1400">
+                <a:latin typeface="Times New Roman"/>
+                <a:ea typeface="Times New Roman"/>
+                <a:cs typeface="Times New Roman"/>
+                <a:sym typeface="Times New Roman"/>
+              </a:rPr>
+              <a:t>v</a:t>
+            </a:r>
+            <a:r>
+              <a:rPr lang="pl" sz="1400">
+                <a:latin typeface="Times New Roman"/>
+                <a:ea typeface="Times New Roman"/>
+                <a:cs typeface="Times New Roman"/>
+                <a:sym typeface="Times New Roman"/>
+              </a:rPr>
+              <a:t>,</a:t>
+            </a:r>
+            <a:r>
+              <a:rPr i="1" lang="pl" sz="1400">
+                <a:latin typeface="Times New Roman"/>
+                <a:ea typeface="Times New Roman"/>
+                <a:cs typeface="Times New Roman"/>
+                <a:sym typeface="Times New Roman"/>
+              </a:rPr>
+              <a:t>w</a:t>
+            </a:r>
+            <a:r>
+              <a:rPr baseline="-25000" i="1" lang="pl" sz="1400">
+                <a:latin typeface="Times New Roman"/>
+                <a:ea typeface="Times New Roman"/>
+                <a:cs typeface="Times New Roman"/>
+                <a:sym typeface="Times New Roman"/>
+              </a:rPr>
+              <a:t>i</a:t>
+            </a:r>
+            <a:r>
+              <a:rPr lang="pl" sz="1400">
+                <a:latin typeface="Times New Roman"/>
+                <a:ea typeface="Times New Roman"/>
+                <a:cs typeface="Times New Roman"/>
+                <a:sym typeface="Times New Roman"/>
+              </a:rPr>
+              <a:t>) przecina wnętrze wielokąta, do którego należy </a:t>
+            </a:r>
+            <a:r>
+              <a:rPr i="1" lang="pl" sz="1400">
+                <a:latin typeface="Times New Roman"/>
+                <a:ea typeface="Times New Roman"/>
+                <a:cs typeface="Times New Roman"/>
+                <a:sym typeface="Times New Roman"/>
+              </a:rPr>
+              <a:t>w</a:t>
+            </a:r>
+            <a:r>
+              <a:rPr baseline="-25000" i="1" lang="pl" sz="1400">
+                <a:latin typeface="Times New Roman"/>
+                <a:ea typeface="Times New Roman"/>
+                <a:cs typeface="Times New Roman"/>
+                <a:sym typeface="Times New Roman"/>
+              </a:rPr>
+              <a:t>i</a:t>
+            </a:r>
+            <a:r>
+              <a:rPr lang="pl" sz="1400">
+                <a:latin typeface="Times New Roman"/>
+                <a:ea typeface="Times New Roman"/>
+                <a:cs typeface="Times New Roman"/>
+                <a:sym typeface="Times New Roman"/>
+              </a:rPr>
+              <a:t> </a:t>
+            </a:r>
+            <a:r>
+              <a:rPr b="1" lang="pl" sz="1400">
+                <a:latin typeface="Times New Roman"/>
+                <a:ea typeface="Times New Roman"/>
+                <a:cs typeface="Times New Roman"/>
+                <a:sym typeface="Times New Roman"/>
+              </a:rPr>
+              <a:t>⟶ false</a:t>
+            </a:r>
+            <a:endParaRPr b="1" sz="1400">
+              <a:latin typeface="Times New Roman"/>
+              <a:ea typeface="Times New Roman"/>
+              <a:cs typeface="Times New Roman"/>
+              <a:sym typeface="Times New Roman"/>
+            </a:endParaRPr>
+          </a:p>
+          <a:p>
+            <a:pPr indent="-317500" lvl="0" marL="457200" rtl="0" algn="l">
+              <a:lnSpc>
+                <a:spcPct val="115000"/>
+              </a:lnSpc>
+              <a:spcBef>
+                <a:spcPts val="0"/>
+              </a:spcBef>
+              <a:spcAft>
+                <a:spcPts val="0"/>
+              </a:spcAft>
+              <a:buSzPts val="1400"/>
+              <a:buFont typeface="Times New Roman"/>
+              <a:buAutoNum type="arabicPeriod"/>
+            </a:pPr>
+            <a:r>
+              <a:rPr lang="pl" sz="1400">
+                <a:latin typeface="Times New Roman"/>
+                <a:ea typeface="Times New Roman"/>
+                <a:cs typeface="Times New Roman"/>
+                <a:sym typeface="Times New Roman"/>
+              </a:rPr>
+              <a:t>Jeśli i = 1 lub </a:t>
+            </a:r>
+            <a:r>
+              <a:rPr i="1" lang="pl" sz="1400">
+                <a:latin typeface="Times New Roman"/>
+                <a:ea typeface="Times New Roman"/>
+                <a:cs typeface="Times New Roman"/>
+                <a:sym typeface="Times New Roman"/>
+              </a:rPr>
+              <a:t>w</a:t>
+            </a:r>
+            <a:r>
+              <a:rPr baseline="-25000" i="1" lang="pl" sz="1400">
+                <a:latin typeface="Times New Roman"/>
+                <a:ea typeface="Times New Roman"/>
+                <a:cs typeface="Times New Roman"/>
+                <a:sym typeface="Times New Roman"/>
+              </a:rPr>
+              <a:t>i-1</a:t>
+            </a:r>
+            <a:r>
+              <a:rPr lang="pl" sz="1400">
+                <a:latin typeface="Times New Roman"/>
+                <a:ea typeface="Times New Roman"/>
+                <a:cs typeface="Times New Roman"/>
+                <a:sym typeface="Times New Roman"/>
+              </a:rPr>
+              <a:t> nie leży na odcinku (</a:t>
+            </a:r>
+            <a:r>
+              <a:rPr i="1" lang="pl" sz="1400">
+                <a:latin typeface="Times New Roman"/>
+                <a:ea typeface="Times New Roman"/>
+                <a:cs typeface="Times New Roman"/>
+                <a:sym typeface="Times New Roman"/>
+              </a:rPr>
+              <a:t>v, w</a:t>
+            </a:r>
+            <a:r>
+              <a:rPr baseline="-25000" i="1" lang="pl" sz="1400">
+                <a:latin typeface="Times New Roman"/>
+                <a:ea typeface="Times New Roman"/>
+                <a:cs typeface="Times New Roman"/>
+                <a:sym typeface="Times New Roman"/>
+              </a:rPr>
+              <a:t>i</a:t>
+            </a:r>
+            <a:r>
+              <a:rPr lang="pl" sz="1400">
+                <a:latin typeface="Times New Roman"/>
+                <a:ea typeface="Times New Roman"/>
+                <a:cs typeface="Times New Roman"/>
+                <a:sym typeface="Times New Roman"/>
+              </a:rPr>
+              <a:t>)</a:t>
+            </a:r>
+            <a:endParaRPr sz="1400">
+              <a:latin typeface="Times New Roman"/>
+              <a:ea typeface="Times New Roman"/>
+              <a:cs typeface="Times New Roman"/>
+              <a:sym typeface="Times New Roman"/>
+            </a:endParaRPr>
+          </a:p>
+          <a:p>
+            <a:pPr indent="-317500" lvl="1" marL="914400" rtl="0" algn="l">
+              <a:lnSpc>
+                <a:spcPct val="115000"/>
+              </a:lnSpc>
+              <a:spcBef>
+                <a:spcPts val="0"/>
+              </a:spcBef>
+              <a:spcAft>
+                <a:spcPts val="0"/>
+              </a:spcAft>
+              <a:buSzPts val="1400"/>
+              <a:buFont typeface="Times New Roman"/>
+              <a:buAutoNum type="arabicPeriod"/>
+            </a:pPr>
+            <a:r>
+              <a:rPr lang="pl">
+                <a:latin typeface="Times New Roman"/>
+                <a:ea typeface="Times New Roman"/>
+                <a:cs typeface="Times New Roman"/>
+                <a:sym typeface="Times New Roman"/>
+              </a:rPr>
+              <a:t>Znajdź w </a:t>
+            </a:r>
+            <a:r>
+              <a:rPr i="1" lang="pl">
+                <a:latin typeface="Times New Roman"/>
+                <a:ea typeface="Times New Roman"/>
+                <a:cs typeface="Times New Roman"/>
+                <a:sym typeface="Times New Roman"/>
+              </a:rPr>
+              <a:t>T</a:t>
+            </a:r>
+            <a:r>
+              <a:rPr lang="pl">
+                <a:latin typeface="Times New Roman"/>
+                <a:ea typeface="Times New Roman"/>
+                <a:cs typeface="Times New Roman"/>
+                <a:sym typeface="Times New Roman"/>
+              </a:rPr>
+              <a:t> odcinek </a:t>
+            </a:r>
+            <a:r>
+              <a:rPr i="1" lang="pl">
+                <a:latin typeface="Times New Roman"/>
+                <a:ea typeface="Times New Roman"/>
+                <a:cs typeface="Times New Roman"/>
+                <a:sym typeface="Times New Roman"/>
+              </a:rPr>
+              <a:t>e</a:t>
+            </a:r>
+            <a:r>
+              <a:rPr lang="pl">
+                <a:latin typeface="Times New Roman"/>
+                <a:ea typeface="Times New Roman"/>
+                <a:cs typeface="Times New Roman"/>
+                <a:sym typeface="Times New Roman"/>
+              </a:rPr>
+              <a:t> najbliższy </a:t>
+            </a:r>
+            <a:r>
+              <a:rPr i="1" lang="pl">
+                <a:latin typeface="Times New Roman"/>
+                <a:ea typeface="Times New Roman"/>
+                <a:cs typeface="Times New Roman"/>
+                <a:sym typeface="Times New Roman"/>
+              </a:rPr>
+              <a:t>v</a:t>
+            </a:r>
+            <a:endParaRPr i="1">
+              <a:latin typeface="Times New Roman"/>
+              <a:ea typeface="Times New Roman"/>
+              <a:cs typeface="Times New Roman"/>
+              <a:sym typeface="Times New Roman"/>
+            </a:endParaRPr>
+          </a:p>
+          <a:p>
+            <a:pPr indent="-317500" lvl="1" marL="914400" rtl="0" algn="l">
+              <a:lnSpc>
+                <a:spcPct val="115000"/>
+              </a:lnSpc>
+              <a:spcBef>
+                <a:spcPts val="0"/>
+              </a:spcBef>
+              <a:spcAft>
+                <a:spcPts val="0"/>
+              </a:spcAft>
+              <a:buSzPts val="1400"/>
+              <a:buFont typeface="Times New Roman"/>
+              <a:buAutoNum type="arabicPeriod"/>
+            </a:pPr>
+            <a:r>
+              <a:rPr lang="pl">
+                <a:latin typeface="Times New Roman"/>
+                <a:ea typeface="Times New Roman"/>
+                <a:cs typeface="Times New Roman"/>
+                <a:sym typeface="Times New Roman"/>
+              </a:rPr>
+              <a:t>Jeśli e istnieje i przecina odcinek (</a:t>
+            </a:r>
+            <a:r>
+              <a:rPr i="1" lang="pl">
+                <a:latin typeface="Times New Roman"/>
+                <a:ea typeface="Times New Roman"/>
+                <a:cs typeface="Times New Roman"/>
+                <a:sym typeface="Times New Roman"/>
+              </a:rPr>
+              <a:t>v</a:t>
+            </a:r>
+            <a:r>
+              <a:rPr i="1" lang="pl">
+                <a:latin typeface="Times New Roman"/>
+                <a:ea typeface="Times New Roman"/>
+                <a:cs typeface="Times New Roman"/>
+                <a:sym typeface="Times New Roman"/>
+              </a:rPr>
+              <a:t>, w</a:t>
+            </a:r>
+            <a:r>
+              <a:rPr baseline="-25000" i="1" lang="pl">
+                <a:latin typeface="Times New Roman"/>
+                <a:ea typeface="Times New Roman"/>
+                <a:cs typeface="Times New Roman"/>
+                <a:sym typeface="Times New Roman"/>
+              </a:rPr>
+              <a:t>i</a:t>
+            </a:r>
+            <a:r>
+              <a:rPr lang="pl">
+                <a:latin typeface="Times New Roman"/>
+                <a:ea typeface="Times New Roman"/>
+                <a:cs typeface="Times New Roman"/>
+                <a:sym typeface="Times New Roman"/>
+              </a:rPr>
+              <a:t>)</a:t>
+            </a:r>
+            <a:r>
+              <a:rPr b="1" lang="pl">
+                <a:latin typeface="Times New Roman"/>
+                <a:ea typeface="Times New Roman"/>
+                <a:cs typeface="Times New Roman"/>
+                <a:sym typeface="Times New Roman"/>
+              </a:rPr>
+              <a:t> ⟶ false</a:t>
+            </a:r>
+            <a:endParaRPr b="1">
+              <a:latin typeface="Times New Roman"/>
+              <a:ea typeface="Times New Roman"/>
+              <a:cs typeface="Times New Roman"/>
+              <a:sym typeface="Times New Roman"/>
+            </a:endParaRPr>
+          </a:p>
+          <a:p>
+            <a:pPr indent="-317500" lvl="1" marL="914400" rtl="0" algn="l">
+              <a:lnSpc>
+                <a:spcPct val="115000"/>
+              </a:lnSpc>
+              <a:spcBef>
+                <a:spcPts val="0"/>
+              </a:spcBef>
+              <a:spcAft>
+                <a:spcPts val="0"/>
+              </a:spcAft>
+              <a:buSzPts val="1400"/>
+              <a:buFont typeface="Times New Roman"/>
+              <a:buAutoNum type="arabicPeriod"/>
+            </a:pPr>
+            <a:r>
+              <a:rPr lang="pl">
+                <a:latin typeface="Times New Roman"/>
+                <a:ea typeface="Times New Roman"/>
+                <a:cs typeface="Times New Roman"/>
+                <a:sym typeface="Times New Roman"/>
+              </a:rPr>
+              <a:t>W przeciwnym razie </a:t>
+            </a:r>
+            <a:r>
+              <a:rPr b="1" lang="pl">
+                <a:latin typeface="Times New Roman"/>
+                <a:ea typeface="Times New Roman"/>
+                <a:cs typeface="Times New Roman"/>
+                <a:sym typeface="Times New Roman"/>
+              </a:rPr>
+              <a:t>⟶ true</a:t>
+            </a:r>
+            <a:endParaRPr b="1">
+              <a:latin typeface="Times New Roman"/>
+              <a:ea typeface="Times New Roman"/>
+              <a:cs typeface="Times New Roman"/>
+              <a:sym typeface="Times New Roman"/>
+            </a:endParaRPr>
+          </a:p>
+          <a:p>
+            <a:pPr indent="-317500" lvl="0" marL="457200" rtl="0" algn="l">
+              <a:lnSpc>
+                <a:spcPct val="115000"/>
+              </a:lnSpc>
+              <a:spcBef>
+                <a:spcPts val="0"/>
+              </a:spcBef>
+              <a:spcAft>
+                <a:spcPts val="0"/>
+              </a:spcAft>
+              <a:buSzPts val="1400"/>
+              <a:buFont typeface="Times New Roman"/>
+              <a:buAutoNum type="arabicPeriod"/>
+            </a:pPr>
+            <a:r>
+              <a:rPr lang="pl" sz="1400">
+                <a:latin typeface="Times New Roman"/>
+                <a:ea typeface="Times New Roman"/>
+                <a:cs typeface="Times New Roman"/>
+                <a:sym typeface="Times New Roman"/>
+              </a:rPr>
+              <a:t>Jeśli </a:t>
+            </a:r>
+            <a:r>
+              <a:rPr i="1" lang="pl" sz="1400">
+                <a:latin typeface="Times New Roman"/>
+                <a:ea typeface="Times New Roman"/>
+                <a:cs typeface="Times New Roman"/>
+                <a:sym typeface="Times New Roman"/>
+              </a:rPr>
+              <a:t>w</a:t>
+            </a:r>
+            <a:r>
+              <a:rPr baseline="-25000" i="1" lang="pl" sz="1400">
+                <a:latin typeface="Times New Roman"/>
+                <a:ea typeface="Times New Roman"/>
+                <a:cs typeface="Times New Roman"/>
+                <a:sym typeface="Times New Roman"/>
+              </a:rPr>
+              <a:t>i-1</a:t>
+            </a:r>
+            <a:r>
+              <a:rPr lang="pl" sz="1400">
+                <a:latin typeface="Times New Roman"/>
+                <a:ea typeface="Times New Roman"/>
+                <a:cs typeface="Times New Roman"/>
+                <a:sym typeface="Times New Roman"/>
+              </a:rPr>
+              <a:t> nie jest widoczny </a:t>
+            </a:r>
+            <a:r>
+              <a:rPr b="1" lang="pl" sz="1400">
+                <a:latin typeface="Times New Roman"/>
+                <a:ea typeface="Times New Roman"/>
+                <a:cs typeface="Times New Roman"/>
+                <a:sym typeface="Times New Roman"/>
+              </a:rPr>
+              <a:t>⟶ false</a:t>
+            </a:r>
+            <a:endParaRPr b="1" sz="1400">
+              <a:latin typeface="Times New Roman"/>
+              <a:ea typeface="Times New Roman"/>
+              <a:cs typeface="Times New Roman"/>
+              <a:sym typeface="Times New Roman"/>
+            </a:endParaRPr>
+          </a:p>
+          <a:p>
+            <a:pPr indent="-317500" lvl="0" marL="457200" rtl="0" algn="l">
+              <a:lnSpc>
+                <a:spcPct val="115000"/>
+              </a:lnSpc>
+              <a:spcBef>
+                <a:spcPts val="0"/>
+              </a:spcBef>
+              <a:spcAft>
+                <a:spcPts val="0"/>
+              </a:spcAft>
+              <a:buSzPts val="1400"/>
+              <a:buFont typeface="Times New Roman"/>
+              <a:buAutoNum type="arabicPeriod"/>
+            </a:pPr>
+            <a:r>
+              <a:rPr lang="pl" sz="1400">
+                <a:latin typeface="Times New Roman"/>
+                <a:ea typeface="Times New Roman"/>
+                <a:cs typeface="Times New Roman"/>
+                <a:sym typeface="Times New Roman"/>
+              </a:rPr>
+              <a:t>W przeciwnym razie:</a:t>
+            </a:r>
+            <a:endParaRPr sz="1400">
+              <a:latin typeface="Times New Roman"/>
+              <a:ea typeface="Times New Roman"/>
+              <a:cs typeface="Times New Roman"/>
+              <a:sym typeface="Times New Roman"/>
+            </a:endParaRPr>
+          </a:p>
+          <a:p>
+            <a:pPr indent="-317500" lvl="1" marL="914400" rtl="0" algn="l">
+              <a:lnSpc>
+                <a:spcPct val="115000"/>
+              </a:lnSpc>
+              <a:spcBef>
+                <a:spcPts val="0"/>
+              </a:spcBef>
+              <a:spcAft>
+                <a:spcPts val="0"/>
+              </a:spcAft>
+              <a:buSzPts val="1400"/>
+              <a:buFont typeface="Times New Roman"/>
+              <a:buAutoNum type="arabicPeriod"/>
+            </a:pPr>
+            <a:r>
+              <a:rPr lang="pl">
+                <a:latin typeface="Times New Roman"/>
+                <a:ea typeface="Times New Roman"/>
+                <a:cs typeface="Times New Roman"/>
+                <a:sym typeface="Times New Roman"/>
+              </a:rPr>
+              <a:t>Znajdź w </a:t>
+            </a:r>
+            <a:r>
+              <a:rPr i="1" lang="pl">
+                <a:latin typeface="Times New Roman"/>
+                <a:ea typeface="Times New Roman"/>
+                <a:cs typeface="Times New Roman"/>
+                <a:sym typeface="Times New Roman"/>
+              </a:rPr>
+              <a:t>T</a:t>
+            </a:r>
+            <a:r>
+              <a:rPr lang="pl">
+                <a:latin typeface="Times New Roman"/>
+                <a:ea typeface="Times New Roman"/>
+                <a:cs typeface="Times New Roman"/>
+                <a:sym typeface="Times New Roman"/>
+              </a:rPr>
+              <a:t> odcinek </a:t>
+            </a:r>
+            <a:r>
+              <a:rPr i="1" lang="pl">
+                <a:latin typeface="Times New Roman"/>
+                <a:ea typeface="Times New Roman"/>
+                <a:cs typeface="Times New Roman"/>
+                <a:sym typeface="Times New Roman"/>
+              </a:rPr>
+              <a:t>e</a:t>
+            </a:r>
+            <a:r>
+              <a:rPr lang="pl">
+                <a:latin typeface="Times New Roman"/>
+                <a:ea typeface="Times New Roman"/>
+                <a:cs typeface="Times New Roman"/>
+                <a:sym typeface="Times New Roman"/>
+              </a:rPr>
+              <a:t> najbliższy przecinający (</a:t>
+            </a:r>
+            <a:r>
+              <a:rPr i="1" lang="pl">
+                <a:latin typeface="Times New Roman"/>
+                <a:ea typeface="Times New Roman"/>
+                <a:cs typeface="Times New Roman"/>
+                <a:sym typeface="Times New Roman"/>
+              </a:rPr>
+              <a:t>w</a:t>
+            </a:r>
+            <a:r>
+              <a:rPr baseline="-25000" i="1" lang="pl">
+                <a:latin typeface="Times New Roman"/>
+                <a:ea typeface="Times New Roman"/>
+                <a:cs typeface="Times New Roman"/>
+                <a:sym typeface="Times New Roman"/>
+              </a:rPr>
+              <a:t>i</a:t>
+            </a:r>
+            <a:r>
+              <a:rPr i="1" lang="pl">
+                <a:latin typeface="Times New Roman"/>
+                <a:ea typeface="Times New Roman"/>
+                <a:cs typeface="Times New Roman"/>
+                <a:sym typeface="Times New Roman"/>
+              </a:rPr>
+              <a:t>,w</a:t>
+            </a:r>
+            <a:r>
+              <a:rPr baseline="-25000" i="1" lang="pl">
+                <a:latin typeface="Times New Roman"/>
+                <a:ea typeface="Times New Roman"/>
+                <a:cs typeface="Times New Roman"/>
+                <a:sym typeface="Times New Roman"/>
+              </a:rPr>
+              <a:t>i-1</a:t>
+            </a:r>
+            <a:r>
+              <a:rPr lang="pl">
+                <a:latin typeface="Times New Roman"/>
+                <a:ea typeface="Times New Roman"/>
+                <a:cs typeface="Times New Roman"/>
+                <a:sym typeface="Times New Roman"/>
+              </a:rPr>
+              <a:t>)</a:t>
+            </a:r>
+            <a:endParaRPr>
+              <a:latin typeface="Times New Roman"/>
+              <a:ea typeface="Times New Roman"/>
+              <a:cs typeface="Times New Roman"/>
+              <a:sym typeface="Times New Roman"/>
+            </a:endParaRPr>
+          </a:p>
+          <a:p>
+            <a:pPr indent="-317500" lvl="1" marL="914400" rtl="0" algn="l">
+              <a:lnSpc>
+                <a:spcPct val="115000"/>
+              </a:lnSpc>
+              <a:spcBef>
+                <a:spcPts val="0"/>
+              </a:spcBef>
+              <a:spcAft>
+                <a:spcPts val="0"/>
+              </a:spcAft>
+              <a:buSzPts val="1400"/>
+              <a:buFont typeface="Times New Roman"/>
+              <a:buAutoNum type="arabicPeriod"/>
+            </a:pPr>
+            <a:r>
+              <a:rPr lang="pl">
+                <a:latin typeface="Times New Roman"/>
+                <a:ea typeface="Times New Roman"/>
+                <a:cs typeface="Times New Roman"/>
+                <a:sym typeface="Times New Roman"/>
+              </a:rPr>
+              <a:t>Jeśli </a:t>
+            </a:r>
+            <a:r>
+              <a:rPr i="1" lang="pl">
+                <a:latin typeface="Times New Roman"/>
+                <a:ea typeface="Times New Roman"/>
+                <a:cs typeface="Times New Roman"/>
+                <a:sym typeface="Times New Roman"/>
+              </a:rPr>
+              <a:t>e</a:t>
+            </a:r>
+            <a:r>
+              <a:rPr lang="pl">
+                <a:latin typeface="Times New Roman"/>
+                <a:ea typeface="Times New Roman"/>
+                <a:cs typeface="Times New Roman"/>
+                <a:sym typeface="Times New Roman"/>
+              </a:rPr>
+              <a:t> istnieje </a:t>
+            </a:r>
+            <a:r>
+              <a:rPr b="1" lang="pl">
+                <a:latin typeface="Times New Roman"/>
+                <a:ea typeface="Times New Roman"/>
+                <a:cs typeface="Times New Roman"/>
+                <a:sym typeface="Times New Roman"/>
+              </a:rPr>
+              <a:t>⟶ false</a:t>
+            </a:r>
+            <a:endParaRPr b="1">
+              <a:latin typeface="Times New Roman"/>
+              <a:ea typeface="Times New Roman"/>
+              <a:cs typeface="Times New Roman"/>
+              <a:sym typeface="Times New Roman"/>
+            </a:endParaRPr>
+          </a:p>
+          <a:p>
+            <a:pPr indent="-317500" lvl="1" marL="914400" rtl="0" algn="l">
+              <a:lnSpc>
+                <a:spcPct val="115000"/>
+              </a:lnSpc>
+              <a:spcBef>
+                <a:spcPts val="0"/>
+              </a:spcBef>
+              <a:spcAft>
+                <a:spcPts val="0"/>
+              </a:spcAft>
+              <a:buSzPts val="1400"/>
+              <a:buFont typeface="Times New Roman"/>
+              <a:buAutoNum type="arabicPeriod"/>
+            </a:pPr>
+            <a:r>
+              <a:rPr lang="pl">
+                <a:latin typeface="Times New Roman"/>
+                <a:ea typeface="Times New Roman"/>
+                <a:cs typeface="Times New Roman"/>
+                <a:sym typeface="Times New Roman"/>
+              </a:rPr>
+              <a:t>W przeciwnym razie </a:t>
+            </a:r>
+            <a:r>
+              <a:rPr b="1" lang="pl">
+                <a:latin typeface="Times New Roman"/>
+                <a:ea typeface="Times New Roman"/>
+                <a:cs typeface="Times New Roman"/>
+                <a:sym typeface="Times New Roman"/>
+              </a:rPr>
+              <a:t>⟶ true</a:t>
+            </a:r>
+            <a:endParaRPr b="1">
+              <a:latin typeface="Times New Roman"/>
+              <a:ea typeface="Times New Roman"/>
+              <a:cs typeface="Times New Roman"/>
+              <a:sym typeface="Times New Roman"/>
+            </a:endParaRPr>
           </a:p>
         </p:txBody>
       </p:sp>
       <p:pic>
         <p:nvPicPr>
-          <p:cNvPr id="80" name="Google Shape;80;p17"/>
+          <p:cNvPr id="82" name="Google Shape;82;p17"/>
           <p:cNvPicPr preferRelativeResize="0"/>
           <p:nvPr/>
         </p:nvPicPr>
@@ -7092,8 +8536,36 @@
         </p:blipFill>
         <p:spPr>
           <a:xfrm>
-            <a:off x="252288" y="742931"/>
-            <a:ext cx="8639425" cy="3657631"/>
+            <a:off x="4975200" y="1152475"/>
+            <a:ext cx="1958225" cy="1198275"/>
+          </a:xfrm>
+          <a:prstGeom prst="rect">
+            <a:avLst/>
+          </a:prstGeom>
+          <a:noFill/>
+          <a:ln>
+            <a:noFill/>
+          </a:ln>
+        </p:spPr>
+      </p:pic>
+      <p:pic>
+        <p:nvPicPr>
+          <p:cNvPr id="83" name="Google Shape;83;p17"/>
+          <p:cNvPicPr preferRelativeResize="0"/>
+          <p:nvPr/>
+        </p:nvPicPr>
+        <p:blipFill>
+          <a:blip r:embed="rId4">
+            <a:alphaModFix/>
+          </a:blip>
+          <a:stretch>
+            <a:fillRect/>
+          </a:stretch>
+        </p:blipFill>
+        <p:spPr>
+          <a:xfrm>
+            <a:off x="4975200" y="3256200"/>
+            <a:ext cx="1958226" cy="1119784"/>
           </a:xfrm>
           <a:prstGeom prst="rect">
             <a:avLst/>
@@ -7117,7 +8589,111 @@
   <p:cSld>
     <p:spTree>
       <p:nvGrpSpPr>
-        <p:cNvPr id="84" name="Shape 84"/>
+        <p:cNvPr id="87" name="Shape 87"/>
+        <p:cNvGrpSpPr/>
+        <p:nvPr/>
+      </p:nvGrpSpPr>
+      <p:grpSpPr>
+        <a:xfrm>
+          <a:off x="0" y="0"/>
+          <a:ext cx="0" cy="0"/>
+          <a:chOff x="0" y="0"/>
+          <a:chExt cx="0" cy="0"/>
+        </a:xfrm>
+      </p:grpSpPr>
+      <p:pic>
+        <p:nvPicPr>
+          <p:cNvPr id="88" name="Google Shape;88;p18"/>
+          <p:cNvPicPr preferRelativeResize="0"/>
+          <p:nvPr/>
+        </p:nvPicPr>
+        <p:blipFill rotWithShape="1">
+          <a:blip r:embed="rId3">
+            <a:alphaModFix/>
+          </a:blip>
+          <a:srcRect b="18361" l="9799" r="9346" t="19541"/>
+          <a:stretch/>
+        </p:blipFill>
+        <p:spPr>
+          <a:xfrm>
+            <a:off x="1309325" y="681262"/>
+            <a:ext cx="6525350" cy="3780974"/>
+          </a:xfrm>
+          <a:prstGeom prst="rect">
+            <a:avLst/>
+          </a:prstGeom>
+          <a:noFill/>
+          <a:ln>
+            <a:noFill/>
+          </a:ln>
+        </p:spPr>
+      </p:pic>
+    </p:spTree>
+  </p:cSld>
+  <p:clrMapOvr>
+    <a:masterClrMapping/>
+  </p:clrMapOvr>
+</p:sld>
+</file>
+
+<file path=ppt/slides/slide7.xml><?xml version="1.0" encoding="utf-8"?>
+<p:sld xmlns:a="http://schemas.openxmlformats.org/drawingml/2006/main" xmlns:r="http://schemas.openxmlformats.org/officeDocument/2006/relationships" xmlns:mc="http://schemas.openxmlformats.org/markup-compatibility/2006" xmlns:mv="urn:schemas-microsoft-com:mac:vml" xmlns:p="http://schemas.openxmlformats.org/presentationml/2006/main" xmlns:c="http://schemas.openxmlformats.org/drawingml/2006/chart" xmlns:dgm="http://schemas.openxmlformats.org/drawingml/2006/diagram" xmlns:o="urn:schemas-microsoft-com:office:office" xmlns:v="urn:schemas-microsoft-com:vml" xmlns:pvml="urn:schemas-microsoft-com:office:powerpoint" xmlns:com="http://schemas.openxmlformats.org/drawingml/2006/compatibility" xmlns:p14="http://schemas.microsoft.com/office/powerpoint/2010/main" xmlns:p15="http://schemas.microsoft.com/office/powerpoint/2012/main">
+  <p:cSld>
+    <p:spTree>
+      <p:nvGrpSpPr>
+        <p:cNvPr id="92" name="Shape 92"/>
+        <p:cNvGrpSpPr/>
+        <p:nvPr/>
+      </p:nvGrpSpPr>
+      <p:grpSpPr>
+        <a:xfrm>
+          <a:off x="0" y="0"/>
+          <a:ext cx="0" cy="0"/>
+          <a:chOff x="0" y="0"/>
+          <a:chExt cx="0" cy="0"/>
+        </a:xfrm>
+      </p:grpSpPr>
+      <p:pic>
+        <p:nvPicPr>
+          <p:cNvPr id="93" name="Google Shape;93;p19"/>
+          <p:cNvPicPr preferRelativeResize="0"/>
+          <p:nvPr/>
+        </p:nvPicPr>
+        <p:blipFill rotWithShape="1">
+          <a:blip r:embed="rId3">
+            <a:alphaModFix/>
+          </a:blip>
+          <a:srcRect b="17809" l="9593" r="9585" t="18854"/>
+          <a:stretch/>
+        </p:blipFill>
+        <p:spPr>
+          <a:xfrm>
+            <a:off x="1313400" y="645350"/>
+            <a:ext cx="6517199" cy="3852801"/>
+          </a:xfrm>
+          <a:prstGeom prst="rect">
+            <a:avLst/>
+          </a:prstGeom>
+          <a:noFill/>
+          <a:ln>
+            <a:noFill/>
+          </a:ln>
+        </p:spPr>
+      </p:pic>
+    </p:spTree>
+  </p:cSld>
+  <p:clrMapOvr>
+    <a:masterClrMapping/>
+  </p:clrMapOvr>
+</p:sld>
+</file>
+
+<file path=ppt/slides/slide8.xml><?xml version="1.0" encoding="utf-8"?>
+<p:sld xmlns:a="http://schemas.openxmlformats.org/drawingml/2006/main" xmlns:r="http://schemas.openxmlformats.org/officeDocument/2006/relationships" xmlns:mc="http://schemas.openxmlformats.org/markup-compatibility/2006" xmlns:mv="urn:schemas-microsoft-com:mac:vml" xmlns:p="http://schemas.openxmlformats.org/presentationml/2006/main" xmlns:c="http://schemas.openxmlformats.org/drawingml/2006/chart" xmlns:dgm="http://schemas.openxmlformats.org/drawingml/2006/diagram" xmlns:o="urn:schemas-microsoft-com:office:office" xmlns:v="urn:schemas-microsoft-com:vml" xmlns:pvml="urn:schemas-microsoft-com:office:powerpoint" xmlns:com="http://schemas.openxmlformats.org/drawingml/2006/compatibility" xmlns:p14="http://schemas.microsoft.com/office/powerpoint/2010/main" xmlns:p15="http://schemas.microsoft.com/office/powerpoint/2012/main">
+  <p:cSld>
+    <p:spTree>
+      <p:nvGrpSpPr>
+        <p:cNvPr id="97" name="Shape 97"/>
         <p:cNvGrpSpPr/>
         <p:nvPr/>
       </p:nvGrpSpPr>
@@ -7131,7 +8707,7 @@
       </p:grpSpPr>
       <p:sp>
         <p:nvSpPr>
-          <p:cNvPr id="85" name="Google Shape;85;p18"/>
+          <p:cNvPr id="98" name="Google Shape;98;p20"/>
           <p:cNvSpPr txBox="1"/>
           <p:nvPr>
             <p:ph type="title"/>
@@ -7162,373 +8738,26 @@
               <a:buNone/>
             </a:pPr>
             <a:r>
-              <a:rPr lang="pl"/>
-              <a:t>Algorytm określający widoczność wierzchołka w</a:t>
-            </a:r>
-            <a:r>
-              <a:rPr baseline="-25000" lang="pl"/>
-              <a:t>i</a:t>
-            </a:r>
-            <a:endParaRPr/>
+              <a:rPr lang="pl">
+                <a:latin typeface="Times New Roman"/>
+                <a:ea typeface="Times New Roman"/>
+                <a:cs typeface="Times New Roman"/>
+                <a:sym typeface="Times New Roman"/>
+              </a:rPr>
+              <a:t>Złożoność algorytmu</a:t>
+            </a:r>
+            <a:endParaRPr>
+              <a:latin typeface="Times New Roman"/>
+              <a:ea typeface="Times New Roman"/>
+              <a:cs typeface="Times New Roman"/>
+              <a:sym typeface="Times New Roman"/>
+            </a:endParaRPr>
           </a:p>
         </p:txBody>
       </p:sp>
       <p:sp>
         <p:nvSpPr>
-          <p:cNvPr id="86" name="Google Shape;86;p18"/>
-          <p:cNvSpPr txBox="1"/>
-          <p:nvPr>
-            <p:ph idx="1" type="body"/>
-          </p:nvPr>
-        </p:nvSpPr>
-        <p:spPr>
-          <a:xfrm>
-            <a:off x="311700" y="1152475"/>
-            <a:ext cx="8520600" cy="3874500"/>
-          </a:xfrm>
-          <a:prstGeom prst="rect">
-            <a:avLst/>
-          </a:prstGeom>
-        </p:spPr>
-        <p:txBody>
-          <a:bodyPr anchorCtr="0" anchor="t" bIns="91425" lIns="91425" spcFirstLastPara="1" rIns="91425" wrap="square" tIns="91425">
-            <a:noAutofit/>
-          </a:bodyPr>
-          <a:lstStyle/>
-          <a:p>
-            <a:pPr indent="-330200" lvl="0" marL="457200" rtl="0" algn="l">
-              <a:lnSpc>
-                <a:spcPct val="150000"/>
-              </a:lnSpc>
-              <a:spcBef>
-                <a:spcPts val="0"/>
-              </a:spcBef>
-              <a:spcAft>
-                <a:spcPts val="0"/>
-              </a:spcAft>
-              <a:buSzPts val="1600"/>
-              <a:buAutoNum type="arabicPeriod"/>
-            </a:pPr>
-            <a:r>
-              <a:rPr lang="pl" sz="1600"/>
-              <a:t>Jeśli (V,w</a:t>
-            </a:r>
-            <a:r>
-              <a:rPr baseline="-25000" lang="pl" sz="1600"/>
-              <a:t>i</a:t>
-            </a:r>
-            <a:r>
-              <a:rPr lang="pl" sz="1600"/>
-              <a:t>) przecina wnętrze wielokąta, do którego należy w</a:t>
-            </a:r>
-            <a:r>
-              <a:rPr baseline="-25000" lang="pl" sz="1600"/>
-              <a:t>i</a:t>
-            </a:r>
-            <a:r>
-              <a:rPr lang="pl" sz="1600"/>
-              <a:t> ⟶ false</a:t>
-            </a:r>
-            <a:endParaRPr sz="1600"/>
-          </a:p>
-          <a:p>
-            <a:pPr indent="-330200" lvl="0" marL="457200" rtl="0" algn="l">
-              <a:lnSpc>
-                <a:spcPct val="150000"/>
-              </a:lnSpc>
-              <a:spcBef>
-                <a:spcPts val="0"/>
-              </a:spcBef>
-              <a:spcAft>
-                <a:spcPts val="0"/>
-              </a:spcAft>
-              <a:buSzPts val="1600"/>
-              <a:buAutoNum type="arabicPeriod"/>
-            </a:pPr>
-            <a:r>
-              <a:rPr lang="pl" sz="1600"/>
-              <a:t>Jeśli i = 1 lub w</a:t>
-            </a:r>
-            <a:r>
-              <a:rPr baseline="-25000" lang="pl" sz="1600"/>
-              <a:t>i-1</a:t>
-            </a:r>
-            <a:r>
-              <a:rPr lang="pl" sz="1600"/>
-              <a:t> nie leży na odcinku (V, w</a:t>
-            </a:r>
-            <a:r>
-              <a:rPr baseline="-25000" lang="pl" sz="1600"/>
-              <a:t>i</a:t>
-            </a:r>
-            <a:r>
-              <a:rPr lang="pl" sz="1600"/>
-              <a:t>)</a:t>
-            </a:r>
-            <a:endParaRPr sz="1600"/>
-          </a:p>
-          <a:p>
-            <a:pPr indent="-323850" lvl="1" marL="914400" rtl="0" algn="l">
-              <a:lnSpc>
-                <a:spcPct val="150000"/>
-              </a:lnSpc>
-              <a:spcBef>
-                <a:spcPts val="0"/>
-              </a:spcBef>
-              <a:spcAft>
-                <a:spcPts val="0"/>
-              </a:spcAft>
-              <a:buSzPts val="1500"/>
-              <a:buAutoNum type="arabicPeriod"/>
-            </a:pPr>
-            <a:r>
-              <a:rPr lang="pl" sz="1500"/>
-              <a:t>Znajdź w T odcinek  e najbliższy V</a:t>
-            </a:r>
-            <a:endParaRPr sz="1500"/>
-          </a:p>
-          <a:p>
-            <a:pPr indent="-323850" lvl="1" marL="914400" rtl="0" algn="l">
-              <a:lnSpc>
-                <a:spcPct val="150000"/>
-              </a:lnSpc>
-              <a:spcBef>
-                <a:spcPts val="0"/>
-              </a:spcBef>
-              <a:spcAft>
-                <a:spcPts val="0"/>
-              </a:spcAft>
-              <a:buSzPts val="1500"/>
-              <a:buAutoNum type="arabicPeriod"/>
-            </a:pPr>
-            <a:r>
-              <a:rPr lang="pl" sz="1500"/>
-              <a:t>Jeśli e istnieje i przecina odcinek (V, w</a:t>
-            </a:r>
-            <a:r>
-              <a:rPr baseline="-25000" lang="pl" sz="1500"/>
-              <a:t>i</a:t>
-            </a:r>
-            <a:r>
-              <a:rPr lang="pl" sz="1500"/>
-              <a:t>) ⟶ false</a:t>
-            </a:r>
-            <a:endParaRPr sz="1500"/>
-          </a:p>
-          <a:p>
-            <a:pPr indent="-323850" lvl="1" marL="914400" rtl="0" algn="l">
-              <a:lnSpc>
-                <a:spcPct val="150000"/>
-              </a:lnSpc>
-              <a:spcBef>
-                <a:spcPts val="0"/>
-              </a:spcBef>
-              <a:spcAft>
-                <a:spcPts val="0"/>
-              </a:spcAft>
-              <a:buSzPts val="1500"/>
-              <a:buAutoNum type="arabicPeriod"/>
-            </a:pPr>
-            <a:r>
-              <a:rPr lang="pl" sz="1500"/>
-              <a:t>W przeciwnym razie ⟶ true</a:t>
-            </a:r>
-            <a:endParaRPr sz="1500"/>
-          </a:p>
-          <a:p>
-            <a:pPr indent="-330200" lvl="0" marL="457200" rtl="0" algn="l">
-              <a:lnSpc>
-                <a:spcPct val="150000"/>
-              </a:lnSpc>
-              <a:spcBef>
-                <a:spcPts val="0"/>
-              </a:spcBef>
-              <a:spcAft>
-                <a:spcPts val="0"/>
-              </a:spcAft>
-              <a:buSzPts val="1600"/>
-              <a:buAutoNum type="arabicPeriod"/>
-            </a:pPr>
-            <a:r>
-              <a:rPr lang="pl" sz="1600"/>
-              <a:t>Jeśli w</a:t>
-            </a:r>
-            <a:r>
-              <a:rPr baseline="-25000" lang="pl" sz="1600"/>
-              <a:t>i-1</a:t>
-            </a:r>
-            <a:r>
-              <a:rPr lang="pl" sz="1600"/>
-              <a:t> nie jest widoczny ⟶ false</a:t>
-            </a:r>
-            <a:endParaRPr sz="1600"/>
-          </a:p>
-          <a:p>
-            <a:pPr indent="-330200" lvl="0" marL="457200" rtl="0" algn="l">
-              <a:lnSpc>
-                <a:spcPct val="150000"/>
-              </a:lnSpc>
-              <a:spcBef>
-                <a:spcPts val="0"/>
-              </a:spcBef>
-              <a:spcAft>
-                <a:spcPts val="0"/>
-              </a:spcAft>
-              <a:buSzPts val="1600"/>
-              <a:buAutoNum type="arabicPeriod"/>
-            </a:pPr>
-            <a:r>
-              <a:rPr lang="pl" sz="1600"/>
-              <a:t>W przeciwnym razie:</a:t>
-            </a:r>
-            <a:endParaRPr sz="1600"/>
-          </a:p>
-          <a:p>
-            <a:pPr indent="-323850" lvl="1" marL="914400" rtl="0" algn="l">
-              <a:lnSpc>
-                <a:spcPct val="150000"/>
-              </a:lnSpc>
-              <a:spcBef>
-                <a:spcPts val="0"/>
-              </a:spcBef>
-              <a:spcAft>
-                <a:spcPts val="0"/>
-              </a:spcAft>
-              <a:buSzPts val="1500"/>
-              <a:buAutoNum type="arabicPeriod"/>
-            </a:pPr>
-            <a:r>
-              <a:rPr lang="pl" sz="1500"/>
-              <a:t>Znajdź w T odcinek  e najbliższy przecinający (w</a:t>
-            </a:r>
-            <a:r>
-              <a:rPr baseline="-25000" lang="pl" sz="1500"/>
-              <a:t>i</a:t>
-            </a:r>
-            <a:r>
-              <a:rPr lang="pl" sz="1500"/>
-              <a:t>,w</a:t>
-            </a:r>
-            <a:r>
-              <a:rPr baseline="-25000" lang="pl" sz="1500"/>
-              <a:t>i-1</a:t>
-            </a:r>
-            <a:r>
-              <a:rPr lang="pl" sz="1500"/>
-              <a:t>)</a:t>
-            </a:r>
-            <a:endParaRPr sz="1500"/>
-          </a:p>
-          <a:p>
-            <a:pPr indent="-323850" lvl="1" marL="914400" rtl="0" algn="l">
-              <a:lnSpc>
-                <a:spcPct val="150000"/>
-              </a:lnSpc>
-              <a:spcBef>
-                <a:spcPts val="0"/>
-              </a:spcBef>
-              <a:spcAft>
-                <a:spcPts val="0"/>
-              </a:spcAft>
-              <a:buSzPts val="1500"/>
-              <a:buAutoNum type="arabicPeriod"/>
-            </a:pPr>
-            <a:r>
-              <a:rPr lang="pl" sz="1500"/>
-              <a:t>Jeśli e istnieje ⟶ false</a:t>
-            </a:r>
-            <a:endParaRPr sz="1500"/>
-          </a:p>
-          <a:p>
-            <a:pPr indent="-323850" lvl="1" marL="914400" rtl="0" algn="l">
-              <a:lnSpc>
-                <a:spcPct val="150000"/>
-              </a:lnSpc>
-              <a:spcBef>
-                <a:spcPts val="0"/>
-              </a:spcBef>
-              <a:spcAft>
-                <a:spcPts val="0"/>
-              </a:spcAft>
-              <a:buSzPts val="1500"/>
-              <a:buAutoNum type="arabicPeriod"/>
-            </a:pPr>
-            <a:r>
-              <a:rPr lang="pl" sz="1500"/>
-              <a:t>W przeciwnym razie ⟶ true</a:t>
-            </a:r>
-            <a:endParaRPr sz="1500"/>
-          </a:p>
-        </p:txBody>
-      </p:sp>
-    </p:spTree>
-  </p:cSld>
-  <p:clrMapOvr>
-    <a:masterClrMapping/>
-  </p:clrMapOvr>
-</p:sld>
-</file>
-
-<file path=ppt/slides/slide7.xml><?xml version="1.0" encoding="utf-8"?>
-<p:sld xmlns:a="http://schemas.openxmlformats.org/drawingml/2006/main" xmlns:r="http://schemas.openxmlformats.org/officeDocument/2006/relationships" xmlns:mc="http://schemas.openxmlformats.org/markup-compatibility/2006" xmlns:mv="urn:schemas-microsoft-com:mac:vml" xmlns:p="http://schemas.openxmlformats.org/presentationml/2006/main" xmlns:c="http://schemas.openxmlformats.org/drawingml/2006/chart" xmlns:dgm="http://schemas.openxmlformats.org/drawingml/2006/diagram" xmlns:o="urn:schemas-microsoft-com:office:office" xmlns:v="urn:schemas-microsoft-com:vml" xmlns:pvml="urn:schemas-microsoft-com:office:powerpoint" xmlns:com="http://schemas.openxmlformats.org/drawingml/2006/compatibility" xmlns:p14="http://schemas.microsoft.com/office/powerpoint/2010/main" xmlns:p15="http://schemas.microsoft.com/office/powerpoint/2012/main">
-  <p:cSld>
-    <p:spTree>
-      <p:nvGrpSpPr>
-        <p:cNvPr id="90" name="Shape 90"/>
-        <p:cNvGrpSpPr/>
-        <p:nvPr/>
-      </p:nvGrpSpPr>
-      <p:grpSpPr>
-        <a:xfrm>
-          <a:off x="0" y="0"/>
-          <a:ext cx="0" cy="0"/>
-          <a:chOff x="0" y="0"/>
-          <a:chExt cx="0" cy="0"/>
-        </a:xfrm>
-      </p:grpSpPr>
-      <p:sp>
-        <p:nvSpPr>
-          <p:cNvPr id="91" name="Google Shape;91;p19"/>
-          <p:cNvSpPr txBox="1"/>
-          <p:nvPr>
-            <p:ph type="title"/>
-          </p:nvPr>
-        </p:nvSpPr>
-        <p:spPr>
-          <a:xfrm>
-            <a:off x="311700" y="445025"/>
-            <a:ext cx="8520600" cy="572700"/>
-          </a:xfrm>
-          <a:prstGeom prst="rect">
-            <a:avLst/>
-          </a:prstGeom>
-        </p:spPr>
-        <p:txBody>
-          <a:bodyPr anchorCtr="0" anchor="t" bIns="91425" lIns="91425" spcFirstLastPara="1" rIns="91425" wrap="square" tIns="91425">
-            <a:noAutofit/>
-          </a:bodyPr>
-          <a:lstStyle/>
-          <a:p>
-            <a:pPr indent="0" lvl="0" marL="0" rtl="0" algn="l">
-              <a:spcBef>
-                <a:spcPts val="0"/>
-              </a:spcBef>
-              <a:spcAft>
-                <a:spcPts val="0"/>
-              </a:spcAft>
-              <a:buNone/>
-            </a:pPr>
-            <a:r>
-              <a:rPr lang="pl"/>
-              <a:t>Złożoność algorytmu</a:t>
-            </a:r>
-            <a:endParaRPr/>
-          </a:p>
-        </p:txBody>
-      </p:sp>
-      <p:sp>
-        <p:nvSpPr>
-          <p:cNvPr id="92" name="Google Shape;92;p19"/>
+          <p:cNvPr id="99" name="Google Shape;99;p20"/>
           <p:cNvSpPr txBox="1"/>
           <p:nvPr>
             <p:ph idx="1" type="body"/>
@@ -7560,21 +8789,69 @@
                 <a:spcPts val="0"/>
               </a:spcAft>
               <a:buSzPts val="1800"/>
+              <a:buFont typeface="Times New Roman"/>
               <a:buChar char="●"/>
             </a:pPr>
             <a:r>
-              <a:rPr lang="pl"/>
-              <a:t>widoczność w</a:t>
-            </a:r>
-            <a:r>
-              <a:rPr baseline="-25000" lang="pl"/>
+              <a:rPr lang="pl">
+                <a:latin typeface="Times New Roman"/>
+                <a:ea typeface="Times New Roman"/>
+                <a:cs typeface="Times New Roman"/>
+                <a:sym typeface="Times New Roman"/>
+              </a:rPr>
+              <a:t>widoczność </a:t>
+            </a:r>
+            <a:r>
+              <a:rPr i="1" lang="pl">
+                <a:latin typeface="Times New Roman"/>
+                <a:ea typeface="Times New Roman"/>
+                <a:cs typeface="Times New Roman"/>
+                <a:sym typeface="Times New Roman"/>
+              </a:rPr>
+              <a:t>w</a:t>
+            </a:r>
+            <a:r>
+              <a:rPr baseline="-25000" i="1" lang="pl">
+                <a:latin typeface="Times New Roman"/>
+                <a:ea typeface="Times New Roman"/>
+                <a:cs typeface="Times New Roman"/>
+                <a:sym typeface="Times New Roman"/>
+              </a:rPr>
               <a:t>i</a:t>
             </a:r>
             <a:r>
-              <a:rPr lang="pl"/>
-              <a:t> - log n</a:t>
-            </a:r>
-            <a:endParaRPr/>
+              <a:rPr lang="pl">
+                <a:latin typeface="Times New Roman"/>
+                <a:ea typeface="Times New Roman"/>
+                <a:cs typeface="Times New Roman"/>
+                <a:sym typeface="Times New Roman"/>
+              </a:rPr>
+              <a:t>:</a:t>
+            </a:r>
+            <a:r>
+              <a:rPr lang="pl">
+                <a:latin typeface="Times New Roman"/>
+                <a:ea typeface="Times New Roman"/>
+                <a:cs typeface="Times New Roman"/>
+                <a:sym typeface="Times New Roman"/>
+              </a:rPr>
+              <a:t> </a:t>
+            </a:r>
+            <a:r>
+              <a:rPr b="1" i="1" lang="pl">
+                <a:latin typeface="Times New Roman"/>
+                <a:ea typeface="Times New Roman"/>
+                <a:cs typeface="Times New Roman"/>
+                <a:sym typeface="Times New Roman"/>
+              </a:rPr>
+              <a:t>O(log n)</a:t>
+            </a:r>
+            <a:endParaRPr b="1" i="1">
+              <a:latin typeface="Times New Roman"/>
+              <a:ea typeface="Times New Roman"/>
+              <a:cs typeface="Times New Roman"/>
+              <a:sym typeface="Times New Roman"/>
+            </a:endParaRPr>
           </a:p>
           <a:p>
             <a:pPr indent="-342900" lvl="0" marL="457200" rtl="0" algn="l">
@@ -7588,13 +8865,60 @@
                 <a:spcPts val="0"/>
               </a:spcAft>
               <a:buSzPts val="1800"/>
+              <a:buFont typeface="Times New Roman"/>
               <a:buChar char="●"/>
             </a:pPr>
             <a:r>
-              <a:rPr lang="pl"/>
-              <a:t>wierzchołki widoczne z V - n log n</a:t>
-            </a:r>
-            <a:endParaRPr/>
+              <a:rPr lang="pl">
+                <a:latin typeface="Times New Roman"/>
+                <a:ea typeface="Times New Roman"/>
+                <a:cs typeface="Times New Roman"/>
+                <a:sym typeface="Times New Roman"/>
+              </a:rPr>
+              <a:t>wierzchołki widoczne z </a:t>
+            </a:r>
+            <a:r>
+              <a:rPr i="1" lang="pl">
+                <a:latin typeface="Times New Roman"/>
+                <a:ea typeface="Times New Roman"/>
+                <a:cs typeface="Times New Roman"/>
+                <a:sym typeface="Times New Roman"/>
+              </a:rPr>
+              <a:t>v</a:t>
+            </a:r>
+            <a:r>
+              <a:rPr lang="pl">
+                <a:latin typeface="Times New Roman"/>
+                <a:ea typeface="Times New Roman"/>
+                <a:cs typeface="Times New Roman"/>
+                <a:sym typeface="Times New Roman"/>
+              </a:rPr>
+              <a:t>:</a:t>
+            </a:r>
+            <a:r>
+              <a:rPr lang="pl">
+                <a:latin typeface="Times New Roman"/>
+                <a:ea typeface="Times New Roman"/>
+                <a:cs typeface="Times New Roman"/>
+                <a:sym typeface="Times New Roman"/>
+              </a:rPr>
+              <a:t> </a:t>
+            </a:r>
+            <a:r>
+              <a:rPr b="1" i="1" lang="pl">
+                <a:latin typeface="Times New Roman"/>
+                <a:ea typeface="Times New Roman"/>
+                <a:cs typeface="Times New Roman"/>
+                <a:sym typeface="Times New Roman"/>
+              </a:rPr>
+              <a:t>O(n log n)</a:t>
+            </a:r>
+            <a:endParaRPr b="1" i="1">
+              <a:latin typeface="Times New Roman"/>
+              <a:ea typeface="Times New Roman"/>
+              <a:cs typeface="Times New Roman"/>
+              <a:sym typeface="Times New Roman"/>
+            </a:endParaRPr>
           </a:p>
           <a:p>
             <a:pPr indent="-342900" lvl="0" marL="457200" rtl="0" algn="l">
@@ -7608,21 +8932,51 @@
                 <a:spcPts val="0"/>
               </a:spcAft>
               <a:buSzPts val="1800"/>
+              <a:buFont typeface="Times New Roman"/>
               <a:buChar char="●"/>
             </a:pPr>
             <a:r>
-              <a:rPr lang="pl"/>
-              <a:t>graf widoczności - n</a:t>
-            </a:r>
-            <a:r>
-              <a:rPr baseline="30000" lang="pl"/>
+              <a:rPr lang="pl">
+                <a:latin typeface="Times New Roman"/>
+                <a:ea typeface="Times New Roman"/>
+                <a:cs typeface="Times New Roman"/>
+                <a:sym typeface="Times New Roman"/>
+              </a:rPr>
+              <a:t>graf widoczności: </a:t>
+            </a:r>
+            <a:r>
+              <a:rPr b="1" i="1" lang="pl">
+                <a:latin typeface="Times New Roman"/>
+                <a:ea typeface="Times New Roman"/>
+                <a:cs typeface="Times New Roman"/>
+                <a:sym typeface="Times New Roman"/>
+              </a:rPr>
+              <a:t>O(n</a:t>
+            </a:r>
+            <a:r>
+              <a:rPr b="1" baseline="30000" i="1" lang="pl">
+                <a:latin typeface="Times New Roman"/>
+                <a:ea typeface="Times New Roman"/>
+                <a:cs typeface="Times New Roman"/>
+                <a:sym typeface="Times New Roman"/>
+              </a:rPr>
               <a:t>2</a:t>
             </a:r>
             <a:r>
-              <a:rPr lang="pl"/>
-              <a:t> log n</a:t>
-            </a:r>
-            <a:endParaRPr/>
+              <a:rPr b="1" i="1" lang="pl">
+                <a:latin typeface="Times New Roman"/>
+                <a:ea typeface="Times New Roman"/>
+                <a:cs typeface="Times New Roman"/>
+                <a:sym typeface="Times New Roman"/>
+              </a:rPr>
+              <a:t> log n)</a:t>
+            </a:r>
+            <a:endParaRPr b="1" i="1">
+              <a:latin typeface="Times New Roman"/>
+              <a:ea typeface="Times New Roman"/>
+              <a:cs typeface="Times New Roman"/>
+              <a:sym typeface="Times New Roman"/>
+            </a:endParaRPr>
           </a:p>
         </p:txBody>
       </p:sp>
@@ -7634,12 +8988,12 @@
 </p:sld>
 </file>
 
-<file path=ppt/slides/slide8.xml><?xml version="1.0" encoding="utf-8"?>
+<file path=ppt/slides/slide9.xml><?xml version="1.0" encoding="utf-8"?>
 <p:sld xmlns:a="http://schemas.openxmlformats.org/drawingml/2006/main" xmlns:r="http://schemas.openxmlformats.org/officeDocument/2006/relationships" xmlns:mc="http://schemas.openxmlformats.org/markup-compatibility/2006" xmlns:mv="urn:schemas-microsoft-com:mac:vml" xmlns:p="http://schemas.openxmlformats.org/presentationml/2006/main" xmlns:c="http://schemas.openxmlformats.org/drawingml/2006/chart" xmlns:dgm="http://schemas.openxmlformats.org/drawingml/2006/diagram" xmlns:o="urn:schemas-microsoft-com:office:office" xmlns:v="urn:schemas-microsoft-com:vml" xmlns:pvml="urn:schemas-microsoft-com:office:powerpoint" xmlns:com="http://schemas.openxmlformats.org/drawingml/2006/compatibility" xmlns:p14="http://schemas.microsoft.com/office/powerpoint/2010/main" xmlns:p15="http://schemas.microsoft.com/office/powerpoint/2012/main">
   <p:cSld>
     <p:spTree>
       <p:nvGrpSpPr>
-        <p:cNvPr id="96" name="Shape 96"/>
+        <p:cNvPr id="103" name="Shape 103"/>
         <p:cNvGrpSpPr/>
         <p:nvPr/>
       </p:nvGrpSpPr>
@@ -7653,7 +9007,7 @@
       </p:grpSpPr>
       <p:sp>
         <p:nvSpPr>
-          <p:cNvPr id="97" name="Google Shape;97;p20"/>
+          <p:cNvPr id="104" name="Google Shape;104;p21"/>
           <p:cNvSpPr txBox="1"/>
           <p:nvPr>
             <p:ph type="title"/>
@@ -7684,16 +9038,26 @@
               <a:buNone/>
             </a:pPr>
             <a:r>
-              <a:rPr lang="pl"/>
+              <a:rPr lang="pl">
+                <a:latin typeface="Times New Roman"/>
+                <a:ea typeface="Times New Roman"/>
+                <a:cs typeface="Times New Roman"/>
+                <a:sym typeface="Times New Roman"/>
+              </a:rPr>
               <a:t>Bibliografia</a:t>
             </a:r>
-            <a:endParaRPr/>
+            <a:endParaRPr>
+              <a:latin typeface="Times New Roman"/>
+              <a:ea typeface="Times New Roman"/>
+              <a:cs typeface="Times New Roman"/>
+              <a:sym typeface="Times New Roman"/>
+            </a:endParaRPr>
           </a:p>
         </p:txBody>
       </p:sp>
       <p:sp>
         <p:nvSpPr>
-          <p:cNvPr id="98" name="Google Shape;98;p20"/>
+          <p:cNvPr id="105" name="Google Shape;105;p21"/>
           <p:cNvSpPr txBox="1"/>
           <p:nvPr>
             <p:ph idx="1" type="body"/>
@@ -7724,10 +9088,46 @@
               <a:buNone/>
             </a:pPr>
             <a:r>
-              <a:rPr lang="pl"/>
-              <a:t>Computational Geometry: Algorithms and Applications Mark de Berg, Otfried Cheong, Marc van Kreveld, Mark Overmarks</a:t>
-            </a:r>
-            <a:endParaRPr/>
+              <a:rPr lang="pl">
+                <a:latin typeface="Times New Roman"/>
+                <a:ea typeface="Times New Roman"/>
+                <a:cs typeface="Times New Roman"/>
+                <a:sym typeface="Times New Roman"/>
+              </a:rPr>
+              <a:t>M</a:t>
+            </a:r>
+            <a:r>
+              <a:rPr lang="pl">
+                <a:latin typeface="Times New Roman"/>
+                <a:ea typeface="Times New Roman"/>
+                <a:cs typeface="Times New Roman"/>
+                <a:sym typeface="Times New Roman"/>
+              </a:rPr>
+              <a:t>ark de Berg, Otfried Cheong, Marc van Kreveld, Mark Overmarks </a:t>
+            </a:r>
+            <a:br>
+              <a:rPr lang="pl">
+                <a:latin typeface="Times New Roman"/>
+                <a:ea typeface="Times New Roman"/>
+                <a:cs typeface="Times New Roman"/>
+                <a:sym typeface="Times New Roman"/>
+              </a:rPr>
+            </a:br>
+            <a:r>
+              <a:rPr b="1" i="1" lang="pl">
+                <a:latin typeface="Times New Roman"/>
+                <a:ea typeface="Times New Roman"/>
+                <a:cs typeface="Times New Roman"/>
+                <a:sym typeface="Times New Roman"/>
+              </a:rPr>
+              <a:t>Computational Geometry: Algorithms and Applications</a:t>
+            </a:r>
+            <a:endParaRPr i="1">
+              <a:latin typeface="Times New Roman"/>
+              <a:ea typeface="Times New Roman"/>
+              <a:cs typeface="Times New Roman"/>
+              <a:sym typeface="Times New Roman"/>
+            </a:endParaRPr>
           </a:p>
         </p:txBody>
       </p:sp>
@@ -7740,285 +9140,6 @@
 </file>
 
 <file path=ppt/theme/theme1.xml><?xml version="1.0" encoding="utf-8"?>
-<a:theme xmlns:a="http://schemas.openxmlformats.org/drawingml/2006/main" xmlns:r="http://schemas.openxmlformats.org/officeDocument/2006/relationships" name="Simple Dark">
-  <a:themeElements>
-    <a:clrScheme name="Simple Dark">
-      <a:dk1>
-        <a:srgbClr val="FFFFFF"/>
-      </a:dk1>
-      <a:lt1>
-        <a:srgbClr val="212121"/>
-      </a:lt1>
-      <a:dk2>
-        <a:srgbClr val="303030"/>
-      </a:dk2>
-      <a:lt2>
-        <a:srgbClr val="ADADAD"/>
-      </a:lt2>
-      <a:accent1>
-        <a:srgbClr val="009688"/>
-      </a:accent1>
-      <a:accent2>
-        <a:srgbClr val="EEEEEE"/>
-      </a:accent2>
-      <a:accent3>
-        <a:srgbClr val="78909C"/>
-      </a:accent3>
-      <a:accent4>
-        <a:srgbClr val="FFAB40"/>
-      </a:accent4>
-      <a:accent5>
-        <a:srgbClr val="4DD0E1"/>
-      </a:accent5>
-      <a:accent6>
-        <a:srgbClr val="EEFF41"/>
-      </a:accent6>
-      <a:hlink>
-        <a:srgbClr val="4DD0E1"/>
-      </a:hlink>
-      <a:folHlink>
-        <a:srgbClr val="4DD0E1"/>
-      </a:folHlink>
-    </a:clrScheme>
-    <a:fontScheme name="Office">
-      <a:majorFont>
-        <a:latin typeface="Arial"/>
-        <a:ea typeface=""/>
-        <a:cs typeface=""/>
-        <a:font script="Jpan" typeface="ＭＳ Ｐゴシック"/>
-        <a:font script="Hang" typeface="맑은 고딕"/>
-        <a:font script="Hans" typeface="宋体"/>
-        <a:font script="Hant" typeface="新細明體"/>
-        <a:font script="Arab" typeface="Times New Roman"/>
-        <a:font script="Hebr" typeface="Times New Roman"/>
-        <a:font script="Thai" typeface="Angsana New"/>
-        <a:font script="Ethi" typeface="Nyala"/>
-        <a:font script="Beng" typeface="Vrinda"/>
-        <a:font script="Gujr" typeface="Shruti"/>
-        <a:font script="Khmr" typeface="MoolBoran"/>
-        <a:font script="Knda" typeface="Tunga"/>
-        <a:font script="Guru" typeface="Raavi"/>
-        <a:font script="Cans" typeface="Euphemia"/>
-        <a:font script="Cher" typeface="Plantagenet Cherokee"/>
-        <a:font script="Yiii" typeface="Microsoft Yi Baiti"/>
-        <a:font script="Tibt" typeface="Microsoft Himalaya"/>
-        <a:font script="Thaa" typeface="MV Boli"/>
-        <a:font script="Deva" typeface="Mangal"/>
-        <a:font script="Telu" typeface="Gautami"/>
-        <a:font script="Taml" typeface="Latha"/>
-        <a:font script="Syrc" typeface="Estrangelo Edessa"/>
-        <a:font script="Orya" typeface="Kalinga"/>
-        <a:font script="Mlym" typeface="Kartika"/>
-        <a:font script="Laoo" typeface="DokChampa"/>
-        <a:font script="Sinh" typeface="Iskoola Pota"/>
-        <a:font script="Mong" typeface="Mongolian Baiti"/>
-        <a:font script="Viet" typeface="Times New Roman"/>
-        <a:font script="Uigh" typeface="Microsoft Uighur"/>
-        <a:font script="Geor" typeface="Sylfaen"/>
-      </a:majorFont>
-      <a:minorFont>
-        <a:latin typeface="Arial"/>
-        <a:ea typeface=""/>
-        <a:cs typeface=""/>
-        <a:font script="Jpan" typeface="ＭＳ Ｐゴシック"/>
-        <a:font script="Hang" typeface="맑은 고딕"/>
-        <a:font script="Hans" typeface="宋体"/>
-        <a:font script="Hant" typeface="新細明體"/>
-        <a:font script="Arab" typeface="Arial"/>
-        <a:font script="Hebr" typeface="Arial"/>
-        <a:font script="Thai" typeface="Cordia New"/>
-        <a:font script="Ethi" typeface="Nyala"/>
-        <a:font script="Beng" typeface="Vrinda"/>
-        <a:font script="Gujr" typeface="Shruti"/>
-        <a:font script="Khmr" typeface="DaunPenh"/>
-        <a:font script="Knda" typeface="Tunga"/>
-        <a:font script="Guru" typeface="Raavi"/>
-        <a:font script="Cans" typeface="Euphemia"/>
-        <a:font script="Cher" typeface="Plantagenet Cherokee"/>
-        <a:font script="Yiii" typeface="Microsoft Yi Baiti"/>
-        <a:font script="Tibt" typeface="Microsoft Himalaya"/>
-        <a:font script="Thaa" typeface="MV Boli"/>
-        <a:font script="Deva" typeface="Mangal"/>
-        <a:font script="Telu" typeface="Gautami"/>
-        <a:font script="Taml" typeface="Latha"/>
-        <a:font script="Syrc" typeface="Estrangelo Edessa"/>
-        <a:font script="Orya" typeface="Kalinga"/>
-        <a:font script="Mlym" typeface="Kartika"/>
-        <a:font script="Laoo" typeface="DokChampa"/>
-        <a:font script="Sinh" typeface="Iskoola Pota"/>
-        <a:font script="Mong" typeface="Mongolian Baiti"/>
-        <a:font script="Viet" typeface="Arial"/>
-        <a:font script="Uigh" typeface="Microsoft Uighur"/>
-        <a:font script="Geor" typeface="Sylfaen"/>
-      </a:minorFont>
-    </a:fontScheme>
-    <a:fmtScheme name="Office">
-      <a:fillStyleLst>
-        <a:solidFill>
-          <a:schemeClr val="phClr"/>
-        </a:solidFill>
-        <a:gradFill rotWithShape="1">
-          <a:gsLst>
-            <a:gs pos="0">
-              <a:schemeClr val="phClr">
-                <a:tint val="50000"/>
-                <a:satMod val="300000"/>
-              </a:schemeClr>
-            </a:gs>
-            <a:gs pos="35000">
-              <a:schemeClr val="phClr">
-                <a:tint val="37000"/>
-                <a:satMod val="300000"/>
-              </a:schemeClr>
-            </a:gs>
-            <a:gs pos="100000">
-              <a:schemeClr val="phClr">
-                <a:tint val="15000"/>
-                <a:satMod val="350000"/>
-              </a:schemeClr>
-            </a:gs>
-          </a:gsLst>
-          <a:lin ang="16200000" scaled="1"/>
-        </a:gradFill>
-        <a:gradFill rotWithShape="1">
-          <a:gsLst>
-            <a:gs pos="0">
-              <a:schemeClr val="phClr">
-                <a:tint val="100000"/>
-                <a:shade val="100000"/>
-                <a:satMod val="130000"/>
-              </a:schemeClr>
-            </a:gs>
-            <a:gs pos="100000">
-              <a:schemeClr val="phClr">
-                <a:tint val="50000"/>
-                <a:shade val="100000"/>
-                <a:satMod val="350000"/>
-              </a:schemeClr>
-            </a:gs>
-          </a:gsLst>
-          <a:lin ang="16200000" scaled="0"/>
-        </a:gradFill>
-      </a:fillStyleLst>
-      <a:lnStyleLst>
-        <a:ln w="9525" cap="flat" cmpd="sng" algn="ctr">
-          <a:solidFill>
-            <a:schemeClr val="phClr">
-              <a:shade val="95000"/>
-              <a:satMod val="105000"/>
-            </a:schemeClr>
-          </a:solidFill>
-          <a:prstDash val="solid"/>
-        </a:ln>
-        <a:ln w="25400" cap="flat" cmpd="sng" algn="ctr">
-          <a:solidFill>
-            <a:schemeClr val="phClr"/>
-          </a:solidFill>
-          <a:prstDash val="solid"/>
-        </a:ln>
-        <a:ln w="38100" cap="flat" cmpd="sng" algn="ctr">
-          <a:solidFill>
-            <a:schemeClr val="phClr"/>
-          </a:solidFill>
-          <a:prstDash val="solid"/>
-        </a:ln>
-      </a:lnStyleLst>
-      <a:effectStyleLst>
-        <a:effectStyle>
-          <a:effectLst>
-            <a:outerShdw blurRad="40000" dist="20000" dir="5400000" rotWithShape="0">
-              <a:srgbClr val="000000">
-                <a:alpha val="38000"/>
-              </a:srgbClr>
-            </a:outerShdw>
-          </a:effectLst>
-        </a:effectStyle>
-        <a:effectStyle>
-          <a:effectLst>
-            <a:outerShdw blurRad="40000" dist="23000" dir="5400000" rotWithShape="0">
-              <a:srgbClr val="000000">
-                <a:alpha val="35000"/>
-              </a:srgbClr>
-            </a:outerShdw>
-          </a:effectLst>
-        </a:effectStyle>
-        <a:effectStyle>
-          <a:effectLst>
-            <a:outerShdw blurRad="40000" dist="23000" dir="5400000" rotWithShape="0">
-              <a:srgbClr val="000000">
-                <a:alpha val="35000"/>
-              </a:srgbClr>
-            </a:outerShdw>
-          </a:effectLst>
-          <a:scene3d>
-            <a:camera prst="orthographicFront">
-              <a:rot lat="0" lon="0" rev="0"/>
-            </a:camera>
-            <a:lightRig rig="threePt" dir="t">
-              <a:rot lat="0" lon="0" rev="1200000"/>
-            </a:lightRig>
-          </a:scene3d>
-          <a:sp3d>
-            <a:bevelT w="63500" h="25400"/>
-          </a:sp3d>
-        </a:effectStyle>
-      </a:effectStyleLst>
-      <a:bgFillStyleLst>
-        <a:solidFill>
-          <a:schemeClr val="phClr"/>
-        </a:solidFill>
-        <a:gradFill rotWithShape="1">
-          <a:gsLst>
-            <a:gs pos="0">
-              <a:schemeClr val="phClr">
-                <a:tint val="40000"/>
-                <a:satMod val="350000"/>
-              </a:schemeClr>
-            </a:gs>
-            <a:gs pos="40000">
-              <a:schemeClr val="phClr">
-                <a:tint val="45000"/>
-                <a:shade val="99000"/>
-                <a:satMod val="350000"/>
-              </a:schemeClr>
-            </a:gs>
-            <a:gs pos="100000">
-              <a:schemeClr val="phClr">
-                <a:shade val="20000"/>
-                <a:satMod val="255000"/>
-              </a:schemeClr>
-            </a:gs>
-          </a:gsLst>
-          <a:path path="circle">
-            <a:fillToRect l="50000" t="-80000" r="50000" b="180000"/>
-          </a:path>
-        </a:gradFill>
-        <a:gradFill rotWithShape="1">
-          <a:gsLst>
-            <a:gs pos="0">
-              <a:schemeClr val="phClr">
-                <a:tint val="80000"/>
-                <a:satMod val="300000"/>
-              </a:schemeClr>
-            </a:gs>
-            <a:gs pos="100000">
-              <a:schemeClr val="phClr">
-                <a:shade val="30000"/>
-                <a:satMod val="200000"/>
-              </a:schemeClr>
-            </a:gs>
-          </a:gsLst>
-          <a:path path="circle">
-            <a:fillToRect l="50000" t="50000" r="50000" b="50000"/>
-          </a:path>
-        </a:gradFill>
-      </a:bgFillStyleLst>
-    </a:fmtScheme>
-  </a:themeElements>
-</a:theme>
-</file>
-
-<file path=ppt/theme/theme2.xml><?xml version="1.0" encoding="utf-8"?>
 <a:theme xmlns:a="http://schemas.openxmlformats.org/drawingml/2006/main" xmlns:r="http://schemas.openxmlformats.org/officeDocument/2006/relationships">
   <a:themeElements>
     <a:clrScheme name="Default">
@@ -8295,4 +9416,283 @@
     </a:fmtScheme>
   </a:themeElements>
 </a:theme>
+</file>
+
+<file path=ppt/theme/theme2.xml><?xml version="1.0" encoding="utf-8"?>
+<a:theme xmlns:a="http://schemas.openxmlformats.org/drawingml/2006/main" xmlns:r="http://schemas.openxmlformats.org/officeDocument/2006/relationships" name="Simple Light">
+  <a:themeElements>
+    <a:clrScheme name="Simple Light">
+      <a:dk1>
+        <a:srgbClr val="000000"/>
+      </a:dk1>
+      <a:lt1>
+        <a:srgbClr val="FFFFFF"/>
+      </a:lt1>
+      <a:dk2>
+        <a:srgbClr val="595959"/>
+      </a:dk2>
+      <a:lt2>
+        <a:srgbClr val="EEEEEE"/>
+      </a:lt2>
+      <a:accent1>
+        <a:srgbClr val="FFAB40"/>
+      </a:accent1>
+      <a:accent2>
+        <a:srgbClr val="212121"/>
+      </a:accent2>
+      <a:accent3>
+        <a:srgbClr val="78909C"/>
+      </a:accent3>
+      <a:accent4>
+        <a:srgbClr val="FFAB40"/>
+      </a:accent4>
+      <a:accent5>
+        <a:srgbClr val="0097A7"/>
+      </a:accent5>
+      <a:accent6>
+        <a:srgbClr val="EEFF41"/>
+      </a:accent6>
+      <a:hlink>
+        <a:srgbClr val="0097A7"/>
+      </a:hlink>
+      <a:folHlink>
+        <a:srgbClr val="0097A7"/>
+      </a:folHlink>
+    </a:clrScheme>
+    <a:fontScheme name="Office">
+      <a:majorFont>
+        <a:latin typeface="Arial"/>
+        <a:ea typeface=""/>
+        <a:cs typeface=""/>
+        <a:font script="Jpan" typeface="ＭＳ Ｐゴシック"/>
+        <a:font script="Hang" typeface="맑은 고딕"/>
+        <a:font script="Hans" typeface="宋体"/>
+        <a:font script="Hant" typeface="新細明體"/>
+        <a:font script="Arab" typeface="Times New Roman"/>
+        <a:font script="Hebr" typeface="Times New Roman"/>
+        <a:font script="Thai" typeface="Angsana New"/>
+        <a:font script="Ethi" typeface="Nyala"/>
+        <a:font script="Beng" typeface="Vrinda"/>
+        <a:font script="Gujr" typeface="Shruti"/>
+        <a:font script="Khmr" typeface="MoolBoran"/>
+        <a:font script="Knda" typeface="Tunga"/>
+        <a:font script="Guru" typeface="Raavi"/>
+        <a:font script="Cans" typeface="Euphemia"/>
+        <a:font script="Cher" typeface="Plantagenet Cherokee"/>
+        <a:font script="Yiii" typeface="Microsoft Yi Baiti"/>
+        <a:font script="Tibt" typeface="Microsoft Himalaya"/>
+        <a:font script="Thaa" typeface="MV Boli"/>
+        <a:font script="Deva" typeface="Mangal"/>
+        <a:font script="Telu" typeface="Gautami"/>
+        <a:font script="Taml" typeface="Latha"/>
+        <a:font script="Syrc" typeface="Estrangelo Edessa"/>
+        <a:font script="Orya" typeface="Kalinga"/>
+        <a:font script="Mlym" typeface="Kartika"/>
+        <a:font script="Laoo" typeface="DokChampa"/>
+        <a:font script="Sinh" typeface="Iskoola Pota"/>
+        <a:font script="Mong" typeface="Mongolian Baiti"/>
+        <a:font script="Viet" typeface="Times New Roman"/>
+        <a:font script="Uigh" typeface="Microsoft Uighur"/>
+        <a:font script="Geor" typeface="Sylfaen"/>
+      </a:majorFont>
+      <a:minorFont>
+        <a:latin typeface="Arial"/>
+        <a:ea typeface=""/>
+        <a:cs typeface=""/>
+        <a:font script="Jpan" typeface="ＭＳ Ｐゴシック"/>
+        <a:font script="Hang" typeface="맑은 고딕"/>
+        <a:font script="Hans" typeface="宋体"/>
+        <a:font script="Hant" typeface="新細明體"/>
+        <a:font script="Arab" typeface="Arial"/>
+        <a:font script="Hebr" typeface="Arial"/>
+        <a:font script="Thai" typeface="Cordia New"/>
+        <a:font script="Ethi" typeface="Nyala"/>
+        <a:font script="Beng" typeface="Vrinda"/>
+        <a:font script="Gujr" typeface="Shruti"/>
+        <a:font script="Khmr" typeface="DaunPenh"/>
+        <a:font script="Knda" typeface="Tunga"/>
+        <a:font script="Guru" typeface="Raavi"/>
+        <a:font script="Cans" typeface="Euphemia"/>
+        <a:font script="Cher" typeface="Plantagenet Cherokee"/>
+        <a:font script="Yiii" typeface="Microsoft Yi Baiti"/>
+        <a:font script="Tibt" typeface="Microsoft Himalaya"/>
+        <a:font script="Thaa" typeface="MV Boli"/>
+        <a:font script="Deva" typeface="Mangal"/>
+        <a:font script="Telu" typeface="Gautami"/>
+        <a:font script="Taml" typeface="Latha"/>
+        <a:font script="Syrc" typeface="Estrangelo Edessa"/>
+        <a:font script="Orya" typeface="Kalinga"/>
+        <a:font script="Mlym" typeface="Kartika"/>
+        <a:font script="Laoo" typeface="DokChampa"/>
+        <a:font script="Sinh" typeface="Iskoola Pota"/>
+        <a:font script="Mong" typeface="Mongolian Baiti"/>
+        <a:font script="Viet" typeface="Arial"/>
+        <a:font script="Uigh" typeface="Microsoft Uighur"/>
+        <a:font script="Geor" typeface="Sylfaen"/>
+      </a:minorFont>
+    </a:fontScheme>
+    <a:fmtScheme name="Office">
+      <a:fillStyleLst>
+        <a:solidFill>
+          <a:schemeClr val="phClr"/>
+        </a:solidFill>
+        <a:gradFill rotWithShape="1">
+          <a:gsLst>
+            <a:gs pos="0">
+              <a:schemeClr val="phClr">
+                <a:tint val="50000"/>
+                <a:satMod val="300000"/>
+              </a:schemeClr>
+            </a:gs>
+            <a:gs pos="35000">
+              <a:schemeClr val="phClr">
+                <a:tint val="37000"/>
+                <a:satMod val="300000"/>
+              </a:schemeClr>
+            </a:gs>
+            <a:gs pos="100000">
+              <a:schemeClr val="phClr">
+                <a:tint val="15000"/>
+                <a:satMod val="350000"/>
+              </a:schemeClr>
+            </a:gs>
+          </a:gsLst>
+          <a:lin ang="16200000" scaled="1"/>
+        </a:gradFill>
+        <a:gradFill rotWithShape="1">
+          <a:gsLst>
+            <a:gs pos="0">
+              <a:schemeClr val="phClr">
+                <a:tint val="100000"/>
+                <a:shade val="100000"/>
+                <a:satMod val="130000"/>
+              </a:schemeClr>
+            </a:gs>
+            <a:gs pos="100000">
+              <a:schemeClr val="phClr">
+                <a:tint val="50000"/>
+                <a:shade val="100000"/>
+                <a:satMod val="350000"/>
+              </a:schemeClr>
+            </a:gs>
+          </a:gsLst>
+          <a:lin ang="16200000" scaled="0"/>
+        </a:gradFill>
+      </a:fillStyleLst>
+      <a:lnStyleLst>
+        <a:ln w="9525" cap="flat" cmpd="sng" algn="ctr">
+          <a:solidFill>
+            <a:schemeClr val="phClr">
+              <a:shade val="95000"/>
+              <a:satMod val="105000"/>
+            </a:schemeClr>
+          </a:solidFill>
+          <a:prstDash val="solid"/>
+        </a:ln>
+        <a:ln w="25400" cap="flat" cmpd="sng" algn="ctr">
+          <a:solidFill>
+            <a:schemeClr val="phClr"/>
+          </a:solidFill>
+          <a:prstDash val="solid"/>
+        </a:ln>
+        <a:ln w="38100" cap="flat" cmpd="sng" algn="ctr">
+          <a:solidFill>
+            <a:schemeClr val="phClr"/>
+          </a:solidFill>
+          <a:prstDash val="solid"/>
+        </a:ln>
+      </a:lnStyleLst>
+      <a:effectStyleLst>
+        <a:effectStyle>
+          <a:effectLst>
+            <a:outerShdw blurRad="40000" dist="20000" dir="5400000" rotWithShape="0">
+              <a:srgbClr val="000000">
+                <a:alpha val="38000"/>
+              </a:srgbClr>
+            </a:outerShdw>
+          </a:effectLst>
+        </a:effectStyle>
+        <a:effectStyle>
+          <a:effectLst>
+            <a:outerShdw blurRad="40000" dist="23000" dir="5400000" rotWithShape="0">
+              <a:srgbClr val="000000">
+                <a:alpha val="35000"/>
+              </a:srgbClr>
+            </a:outerShdw>
+          </a:effectLst>
+        </a:effectStyle>
+        <a:effectStyle>
+          <a:effectLst>
+            <a:outerShdw blurRad="40000" dist="23000" dir="5400000" rotWithShape="0">
+              <a:srgbClr val="000000">
+                <a:alpha val="35000"/>
+              </a:srgbClr>
+            </a:outerShdw>
+          </a:effectLst>
+          <a:scene3d>
+            <a:camera prst="orthographicFront">
+              <a:rot lat="0" lon="0" rev="0"/>
+            </a:camera>
+            <a:lightRig rig="threePt" dir="t">
+              <a:rot lat="0" lon="0" rev="1200000"/>
+            </a:lightRig>
+          </a:scene3d>
+          <a:sp3d>
+            <a:bevelT w="63500" h="25400"/>
+          </a:sp3d>
+        </a:effectStyle>
+      </a:effectStyleLst>
+      <a:bgFillStyleLst>
+        <a:solidFill>
+          <a:schemeClr val="phClr"/>
+        </a:solidFill>
+        <a:gradFill rotWithShape="1">
+          <a:gsLst>
+            <a:gs pos="0">
+              <a:schemeClr val="phClr">
+                <a:tint val="40000"/>
+                <a:satMod val="350000"/>
+              </a:schemeClr>
+            </a:gs>
+            <a:gs pos="40000">
+              <a:schemeClr val="phClr">
+                <a:tint val="45000"/>
+                <a:shade val="99000"/>
+                <a:satMod val="350000"/>
+              </a:schemeClr>
+            </a:gs>
+            <a:gs pos="100000">
+              <a:schemeClr val="phClr">
+                <a:shade val="20000"/>
+                <a:satMod val="255000"/>
+              </a:schemeClr>
+            </a:gs>
+          </a:gsLst>
+          <a:path path="circle">
+            <a:fillToRect l="50000" t="-80000" r="50000" b="180000"/>
+          </a:path>
+        </a:gradFill>
+        <a:gradFill rotWithShape="1">
+          <a:gsLst>
+            <a:gs pos="0">
+              <a:schemeClr val="phClr">
+                <a:tint val="80000"/>
+                <a:satMod val="300000"/>
+              </a:schemeClr>
+            </a:gs>
+            <a:gs pos="100000">
+              <a:schemeClr val="phClr">
+                <a:shade val="30000"/>
+                <a:satMod val="200000"/>
+              </a:schemeClr>
+            </a:gs>
+          </a:gsLst>
+          <a:path path="circle">
+            <a:fillToRect l="50000" t="50000" r="50000" b="50000"/>
+          </a:path>
+        </a:gradFill>
+      </a:bgFillStyleLst>
+    </a:fmtScheme>
+  </a:themeElements>
+</a:theme>
 </file>
</xml_diff>